<commit_message>
updated btc_graph with new functions
</commit_message>
<xml_diff>
--- a/BTC_Journey_Presentation.pptx
+++ b/BTC_Journey_Presentation.pptx
@@ -18,6 +18,13 @@
     <p:sldId id="263" r:id="rId15"/>
     <p:sldId id="264" r:id="rId16"/>
     <p:sldId id="265" r:id="rId17"/>
+    <p:sldId id="266" r:id="rId18"/>
+    <p:sldId id="267" r:id="rId19"/>
+    <p:sldId id="268" r:id="rId20"/>
+    <p:sldId id="269" r:id="rId21"/>
+    <p:sldId id="270" r:id="rId22"/>
+    <p:sldId id="271" r:id="rId23"/>
+    <p:sldId id="272" r:id="rId24"/>
   </p:sldIdLst>
   <p:sldSz cx="9144000" cy="5143500"/>
   <p:notesSz cx="6858000" cy="9144000"/>
@@ -3224,7 +3231,7 @@
               <a:srgbClr val="FEDF98"/>
             </a:gs>
           </a:gsLst>
-          <a:lin ang="0" scaled="0"/>
+          <a:lin ang="5400000" scaled="0"/>
         </a:gradFill>
       </p:bgPr>
     </p:bg>
@@ -3280,6 +3287,2125 @@
           <a:p>
             <a:pPr/>
             <a:r>
+              <a:t>Google Search Trends Overlayed Bitcoin Price</a:t>
+            </a:r>
+          </a:p>
+        </p:txBody>
+      </p:sp>
+      <p:pic>
+        <p:nvPicPr>
+          <p:cNvPr id="148" name="BTC_price_search.png" descr="BTC_price_search.png"/>
+          <p:cNvPicPr>
+            <a:picLocks noChangeAspect="0"/>
+          </p:cNvPicPr>
+          <p:nvPr/>
+        </p:nvPicPr>
+        <p:blipFill>
+          <a:blip r:embed="rId2">
+            <a:extLst/>
+          </a:blip>
+          <a:stretch>
+            <a:fillRect/>
+          </a:stretch>
+        </p:blipFill>
+        <p:spPr>
+          <a:xfrm>
+            <a:off x="198565" y="1066800"/>
+            <a:ext cx="8940801" cy="3962400"/>
+          </a:xfrm>
+          <a:prstGeom prst="rect">
+            <a:avLst/>
+          </a:prstGeom>
+          <a:ln w="12700">
+            <a:miter lim="400000"/>
+          </a:ln>
+          <a:effectLst>
+            <a:outerShdw sx="100000" sy="100000" kx="0" ky="0" algn="b" rotWithShape="0" blurRad="254000" dist="127000" dir="16200000">
+              <a:srgbClr val="000000">
+                <a:alpha val="70000"/>
+              </a:srgbClr>
+            </a:outerShdw>
+          </a:effectLst>
+        </p:spPr>
+      </p:pic>
+    </p:spTree>
+  </p:cSld>
+  <p:clrMapOvr>
+    <a:masterClrMapping/>
+  </p:clrMapOvr>
+  <mc:AlternateContent xmlns:mc="http://schemas.openxmlformats.org/markup-compatibility/2006">
+    <mc:Choice xmlns:p14="http://schemas.microsoft.com/office/powerpoint/2010/main" Requires="p14">
+      <p:transition spd="fast" advClick="1" p14:dur="750">
+        <p:push dir="l"/>
+      </p:transition>
+    </mc:Choice>
+    <mc:Fallback>
+      <p:transition spd="fast">
+        <p:fade/>
+      </p:transition>
+    </mc:Fallback>
+  </mc:AlternateContent>
+  <p:timing>
+    <p:tnLst>
+      <p:par>
+        <p:cTn id="1" nodeType="tmRoot" restart="never" dur="indefinite" fill="hold">
+          <p:childTnLst>
+            <p:seq concurrent="1" prevAc="none" nextAc="seek">
+              <p:cTn id="2" nodeType="mainSeq" dur="indefinite" fill="hold">
+                <p:childTnLst>
+                  <p:par>
+                    <p:cTn id="3" fill="hold">
+                      <p:stCondLst>
+                        <p:cond delay="indefinite"/>
+                        <p:cond evt="onBegin">
+                          <p:tn val="2"/>
+                        </p:cond>
+                      </p:stCondLst>
+                      <p:childTnLst>
+                        <p:par>
+                          <p:cTn id="4" fill="hold">
+                            <p:stCondLst>
+                              <p:cond delay="0"/>
+                            </p:stCondLst>
+                            <p:childTnLst>
+                              <p:par>
+                                <p:cTn id="5" presetClass="entr" nodeType="afterEffect" presetID="9" grpId="1" fill="hold">
+                                  <p:stCondLst>
+                                    <p:cond delay="0"/>
+                                  </p:stCondLst>
+                                  <p:iterate type="el" backwards="0">
+                                    <p:tmAbs val="0"/>
+                                  </p:iterate>
+                                  <p:childTnLst>
+                                    <p:set>
+                                      <p:cBhvr>
+                                        <p:cTn id="6" fill="hold"/>
+                                        <p:tgtEl>
+                                          <p:spTgt spid="147"/>
+                                        </p:tgtEl>
+                                        <p:attrNameLst>
+                                          <p:attrName>style.visibility</p:attrName>
+                                        </p:attrNameLst>
+                                      </p:cBhvr>
+                                      <p:to>
+                                        <p:strVal val="visible"/>
+                                      </p:to>
+                                    </p:set>
+                                    <p:animEffect filter="dissolve" transition="in">
+                                      <p:cBhvr>
+                                        <p:cTn id="7" dur="1000"/>
+                                        <p:tgtEl>
+                                          <p:spTgt spid="147"/>
+                                        </p:tgtEl>
+                                      </p:cBhvr>
+                                    </p:animEffect>
+                                  </p:childTnLst>
+                                </p:cTn>
+                              </p:par>
+                            </p:childTnLst>
+                          </p:cTn>
+                        </p:par>
+                      </p:childTnLst>
+                    </p:cTn>
+                  </p:par>
+                  <p:par>
+                    <p:cTn id="8" fill="hold">
+                      <p:stCondLst>
+                        <p:cond delay="indefinite"/>
+                      </p:stCondLst>
+                      <p:childTnLst>
+                        <p:par>
+                          <p:cTn id="9" fill="hold">
+                            <p:stCondLst>
+                              <p:cond delay="0"/>
+                            </p:stCondLst>
+                            <p:childTnLst>
+                              <p:par>
+                                <p:cTn id="10" presetClass="entr" nodeType="clickEffect" presetID="10" grpId="2" fill="hold">
+                                  <p:stCondLst>
+                                    <p:cond delay="0"/>
+                                  </p:stCondLst>
+                                  <p:iterate type="el" backwards="0">
+                                    <p:tmAbs val="0"/>
+                                  </p:iterate>
+                                  <p:childTnLst>
+                                    <p:set>
+                                      <p:cBhvr>
+                                        <p:cTn id="11" fill="hold"/>
+                                        <p:tgtEl>
+                                          <p:spTgt spid="148"/>
+                                        </p:tgtEl>
+                                        <p:attrNameLst>
+                                          <p:attrName>style.visibility</p:attrName>
+                                        </p:attrNameLst>
+                                      </p:cBhvr>
+                                      <p:to>
+                                        <p:strVal val="visible"/>
+                                      </p:to>
+                                    </p:set>
+                                    <p:animEffect filter="fade" transition="in">
+                                      <p:cBhvr>
+                                        <p:cTn id="12" dur="1500"/>
+                                        <p:tgtEl>
+                                          <p:spTgt spid="148"/>
+                                        </p:tgtEl>
+                                      </p:cBhvr>
+                                    </p:animEffect>
+                                  </p:childTnLst>
+                                </p:cTn>
+                              </p:par>
+                            </p:childTnLst>
+                          </p:cTn>
+                        </p:par>
+                      </p:childTnLst>
+                    </p:cTn>
+                  </p:par>
+                </p:childTnLst>
+              </p:cTn>
+              <p:prevCondLst>
+                <p:cond evt="onPrev">
+                  <p:tgtEl>
+                    <p:sldTgt/>
+                  </p:tgtEl>
+                </p:cond>
+              </p:prevCondLst>
+              <p:nextCondLst>
+                <p:cond evt="onNext">
+                  <p:tgtEl>
+                    <p:sldTgt/>
+                  </p:tgtEl>
+                </p:cond>
+              </p:nextCondLst>
+            </p:seq>
+          </p:childTnLst>
+        </p:cTn>
+      </p:par>
+    </p:tnLst>
+    <p:bldLst>
+      <p:bldP build="whole" bldLvl="1" animBg="1" rev="0" advAuto="0" spid="148" grpId="2"/>
+      <p:bldP build="whole" bldLvl="1" animBg="1" rev="0" advAuto="0" spid="147" grpId="1"/>
+    </p:bldLst>
+  </p:timing>
+</p:sld>
+</file>
+
+<file path=ppt/slides/slide11.xml><?xml version="1.0" encoding="utf-8"?>
+<p:sld xmlns:a="http://schemas.openxmlformats.org/drawingml/2006/main" xmlns:r="http://schemas.openxmlformats.org/officeDocument/2006/relationships" xmlns:p="http://schemas.openxmlformats.org/presentationml/2006/main" xmlns:m="http://schemas.openxmlformats.org/officeDocument/2006/math" xmlns:a14="http://schemas.microsoft.com/office/drawing/2010/main" showMasterSp="1" showMasterPhAnim="1">
+  <p:cSld>
+    <p:bg>
+      <p:bgPr>
+        <a:gradFill flip="none" rotWithShape="1">
+          <a:gsLst>
+            <a:gs pos="0">
+              <a:srgbClr val="FCBD00"/>
+            </a:gs>
+            <a:gs pos="35000">
+              <a:srgbClr val="FFE4D1"/>
+            </a:gs>
+            <a:gs pos="100000">
+              <a:srgbClr val="FEDF98"/>
+            </a:gs>
+          </a:gsLst>
+          <a:lin ang="10800000" scaled="0"/>
+        </a:gradFill>
+      </p:bgPr>
+    </p:bg>
+    <p:spTree>
+      <p:nvGrpSpPr>
+        <p:cNvPr id="1" name=""/>
+        <p:cNvGrpSpPr/>
+        <p:nvPr/>
+      </p:nvGrpSpPr>
+      <p:grpSpPr>
+        <a:xfrm>
+          <a:off x="0" y="0"/>
+          <a:ext cx="0" cy="0"/>
+          <a:chOff x="0" y="0"/>
+          <a:chExt cx="0" cy="0"/>
+        </a:xfrm>
+      </p:grpSpPr>
+      <p:pic>
+        <p:nvPicPr>
+          <p:cNvPr id="150" name="Search_2020-03-09_2020-03-19.png" descr="Search_2020-03-09_2020-03-19.png"/>
+          <p:cNvPicPr>
+            <a:picLocks noChangeAspect="1"/>
+          </p:cNvPicPr>
+          <p:nvPr/>
+        </p:nvPicPr>
+        <p:blipFill>
+          <a:blip r:embed="rId2">
+            <a:extLst/>
+          </a:blip>
+          <a:stretch>
+            <a:fillRect/>
+          </a:stretch>
+        </p:blipFill>
+        <p:spPr>
+          <a:xfrm>
+            <a:off x="446957" y="1008563"/>
+            <a:ext cx="8250086" cy="3811629"/>
+          </a:xfrm>
+          <a:prstGeom prst="rect">
+            <a:avLst/>
+          </a:prstGeom>
+          <a:ln w="12700">
+            <a:miter lim="400000"/>
+          </a:ln>
+        </p:spPr>
+      </p:pic>
+      <p:sp>
+        <p:nvSpPr>
+          <p:cNvPr id="151" name="Google Shape;95;p20"/>
+          <p:cNvSpPr txBox="1"/>
+          <p:nvPr>
+            <p:ph type="body" sz="quarter" idx="1"/>
+          </p:nvPr>
+        </p:nvSpPr>
+        <p:spPr>
+          <a:xfrm>
+            <a:off x="311699" y="301575"/>
+            <a:ext cx="8520602" cy="546101"/>
+          </a:xfrm>
+          <a:prstGeom prst="rect">
+            <a:avLst/>
+          </a:prstGeom>
+        </p:spPr>
+        <p:txBody>
+          <a:bodyPr/>
+          <a:lstStyle>
+            <a:lvl1pPr marL="0" indent="0" algn="ctr" defTabSz="557784">
+              <a:lnSpc>
+                <a:spcPct val="100000"/>
+              </a:lnSpc>
+              <a:buClrTx/>
+              <a:buSzTx/>
+              <a:buFontTx/>
+              <a:buNone/>
+              <a:defRPr sz="2562">
+                <a:solidFill>
+                  <a:srgbClr val="000000"/>
+                </a:solidFill>
+              </a:defRPr>
+            </a:lvl1pPr>
+          </a:lstStyle>
+          <a:p>
+            <a:pPr/>
+            <a:r>
+              <a:t>Google Search 2020-03-09 To 2020-03-19</a:t>
+            </a:r>
+          </a:p>
+        </p:txBody>
+      </p:sp>
+    </p:spTree>
+  </p:cSld>
+  <p:clrMapOvr>
+    <a:masterClrMapping/>
+  </p:clrMapOvr>
+  <mc:AlternateContent xmlns:mc="http://schemas.openxmlformats.org/markup-compatibility/2006">
+    <mc:Choice xmlns:p14="http://schemas.microsoft.com/office/powerpoint/2010/main" Requires="p14">
+      <p:transition spd="med" advClick="1" p14:dur="1000">
+        <p:dissolve/>
+      </p:transition>
+    </mc:Choice>
+    <mc:Fallback>
+      <p:transition spd="med">
+        <p:fade/>
+      </p:transition>
+    </mc:Fallback>
+  </mc:AlternateContent>
+  <p:timing>
+    <p:tnLst>
+      <p:par>
+        <p:cTn id="1" nodeType="tmRoot" restart="never" dur="indefinite" fill="hold">
+          <p:childTnLst>
+            <p:seq concurrent="1" prevAc="none" nextAc="seek">
+              <p:cTn id="2" nodeType="mainSeq" dur="indefinite" fill="hold">
+                <p:childTnLst>
+                  <p:par>
+                    <p:cTn id="3" fill="hold">
+                      <p:stCondLst>
+                        <p:cond delay="indefinite"/>
+                        <p:cond evt="onBegin">
+                          <p:tn val="2"/>
+                        </p:cond>
+                      </p:stCondLst>
+                      <p:childTnLst>
+                        <p:par>
+                          <p:cTn id="4" fill="hold">
+                            <p:stCondLst>
+                              <p:cond delay="0"/>
+                            </p:stCondLst>
+                            <p:childTnLst>
+                              <p:par>
+                                <p:cTn id="5" presetClass="entr" nodeType="afterEffect" presetSubtype="1" presetID="2" grpId="1" fill="hold">
+                                  <p:stCondLst>
+                                    <p:cond delay="0"/>
+                                  </p:stCondLst>
+                                  <p:iterate type="el" backwards="0">
+                                    <p:tmAbs val="0"/>
+                                  </p:iterate>
+                                  <p:childTnLst>
+                                    <p:set>
+                                      <p:cBhvr>
+                                        <p:cTn id="6" fill="hold"/>
+                                        <p:tgtEl>
+                                          <p:spTgt spid="151"/>
+                                        </p:tgtEl>
+                                        <p:attrNameLst>
+                                          <p:attrName>style.visibility</p:attrName>
+                                        </p:attrNameLst>
+                                      </p:cBhvr>
+                                      <p:to>
+                                        <p:strVal val="visible"/>
+                                      </p:to>
+                                    </p:set>
+                                    <p:anim calcmode="lin" valueType="num">
+                                      <p:cBhvr>
+                                        <p:cTn id="7" dur="1000" fill="hold"/>
+                                        <p:tgtEl>
+                                          <p:spTgt spid="151"/>
+                                        </p:tgtEl>
+                                        <p:attrNameLst>
+                                          <p:attrName>ppt_x</p:attrName>
+                                        </p:attrNameLst>
+                                      </p:cBhvr>
+                                      <p:tavLst>
+                                        <p:tav tm="0">
+                                          <p:val>
+                                            <p:strVal val="#ppt_x"/>
+                                          </p:val>
+                                        </p:tav>
+                                        <p:tav tm="100000">
+                                          <p:val>
+                                            <p:strVal val="#ppt_x"/>
+                                          </p:val>
+                                        </p:tav>
+                                      </p:tavLst>
+                                    </p:anim>
+                                    <p:anim calcmode="lin" valueType="num">
+                                      <p:cBhvr>
+                                        <p:cTn id="8" dur="1000" fill="hold"/>
+                                        <p:tgtEl>
+                                          <p:spTgt spid="151"/>
+                                        </p:tgtEl>
+                                        <p:attrNameLst>
+                                          <p:attrName>ppt_y</p:attrName>
+                                        </p:attrNameLst>
+                                      </p:cBhvr>
+                                      <p:tavLst>
+                                        <p:tav tm="0">
+                                          <p:val>
+                                            <p:strVal val="0-#ppt_h/2"/>
+                                          </p:val>
+                                        </p:tav>
+                                        <p:tav tm="100000">
+                                          <p:val>
+                                            <p:strVal val="#ppt_y"/>
+                                          </p:val>
+                                        </p:tav>
+                                      </p:tavLst>
+                                    </p:anim>
+                                  </p:childTnLst>
+                                </p:cTn>
+                              </p:par>
+                            </p:childTnLst>
+                          </p:cTn>
+                        </p:par>
+                      </p:childTnLst>
+                    </p:cTn>
+                  </p:par>
+                  <p:par>
+                    <p:cTn id="9" fill="hold">
+                      <p:stCondLst>
+                        <p:cond delay="indefinite"/>
+                      </p:stCondLst>
+                      <p:childTnLst>
+                        <p:par>
+                          <p:cTn id="10" fill="hold">
+                            <p:stCondLst>
+                              <p:cond delay="0"/>
+                            </p:stCondLst>
+                            <p:childTnLst>
+                              <p:par>
+                                <p:cTn id="11" presetClass="entr" nodeType="clickEffect" presetID="9" grpId="2" fill="hold">
+                                  <p:stCondLst>
+                                    <p:cond delay="0"/>
+                                  </p:stCondLst>
+                                  <p:iterate type="el" backwards="0">
+                                    <p:tmAbs val="0"/>
+                                  </p:iterate>
+                                  <p:childTnLst>
+                                    <p:set>
+                                      <p:cBhvr>
+                                        <p:cTn id="12" fill="hold"/>
+                                        <p:tgtEl>
+                                          <p:spTgt spid="150"/>
+                                        </p:tgtEl>
+                                        <p:attrNameLst>
+                                          <p:attrName>style.visibility</p:attrName>
+                                        </p:attrNameLst>
+                                      </p:cBhvr>
+                                      <p:to>
+                                        <p:strVal val="visible"/>
+                                      </p:to>
+                                    </p:set>
+                                    <p:animEffect filter="dissolve" transition="in">
+                                      <p:cBhvr>
+                                        <p:cTn id="13" dur="1500"/>
+                                        <p:tgtEl>
+                                          <p:spTgt spid="150"/>
+                                        </p:tgtEl>
+                                      </p:cBhvr>
+                                    </p:animEffect>
+                                  </p:childTnLst>
+                                </p:cTn>
+                              </p:par>
+                            </p:childTnLst>
+                          </p:cTn>
+                        </p:par>
+                      </p:childTnLst>
+                    </p:cTn>
+                  </p:par>
+                </p:childTnLst>
+              </p:cTn>
+              <p:prevCondLst>
+                <p:cond evt="onPrev">
+                  <p:tgtEl>
+                    <p:sldTgt/>
+                  </p:tgtEl>
+                </p:cond>
+              </p:prevCondLst>
+              <p:nextCondLst>
+                <p:cond evt="onNext">
+                  <p:tgtEl>
+                    <p:sldTgt/>
+                  </p:tgtEl>
+                </p:cond>
+              </p:nextCondLst>
+            </p:seq>
+          </p:childTnLst>
+        </p:cTn>
+      </p:par>
+    </p:tnLst>
+    <p:bldLst>
+      <p:bldP build="whole" bldLvl="1" animBg="1" rev="0" advAuto="0" spid="151" grpId="1"/>
+      <p:bldP build="whole" bldLvl="1" animBg="1" rev="0" advAuto="0" spid="150" grpId="2"/>
+    </p:bldLst>
+  </p:timing>
+</p:sld>
+</file>
+
+<file path=ppt/slides/slide12.xml><?xml version="1.0" encoding="utf-8"?>
+<p:sld xmlns:a="http://schemas.openxmlformats.org/drawingml/2006/main" xmlns:r="http://schemas.openxmlformats.org/officeDocument/2006/relationships" xmlns:p="http://schemas.openxmlformats.org/presentationml/2006/main" xmlns:m="http://schemas.openxmlformats.org/officeDocument/2006/math" xmlns:a14="http://schemas.microsoft.com/office/drawing/2010/main" showMasterSp="1" showMasterPhAnim="1">
+  <p:cSld>
+    <p:bg>
+      <p:bgPr>
+        <a:gradFill flip="none" rotWithShape="1">
+          <a:gsLst>
+            <a:gs pos="0">
+              <a:srgbClr val="FCBD00"/>
+            </a:gs>
+            <a:gs pos="35000">
+              <a:srgbClr val="FFE4D1"/>
+            </a:gs>
+            <a:gs pos="100000">
+              <a:srgbClr val="FEDF98"/>
+            </a:gs>
+          </a:gsLst>
+          <a:lin ang="16200000" scaled="0"/>
+        </a:gradFill>
+      </p:bgPr>
+    </p:bg>
+    <p:spTree>
+      <p:nvGrpSpPr>
+        <p:cNvPr id="1" name=""/>
+        <p:cNvGrpSpPr/>
+        <p:nvPr/>
+      </p:nvGrpSpPr>
+      <p:grpSpPr>
+        <a:xfrm>
+          <a:off x="0" y="0"/>
+          <a:ext cx="0" cy="0"/>
+          <a:chOff x="0" y="0"/>
+          <a:chExt cx="0" cy="0"/>
+        </a:xfrm>
+      </p:grpSpPr>
+      <p:pic>
+        <p:nvPicPr>
+          <p:cNvPr id="153" name="Search_2021-02-05_2021-02-15.png" descr="Search_2021-02-05_2021-02-15.png"/>
+          <p:cNvPicPr>
+            <a:picLocks noChangeAspect="1"/>
+          </p:cNvPicPr>
+          <p:nvPr/>
+        </p:nvPicPr>
+        <p:blipFill>
+          <a:blip r:embed="rId2">
+            <a:extLst/>
+          </a:blip>
+          <a:stretch>
+            <a:fillRect/>
+          </a:stretch>
+        </p:blipFill>
+        <p:spPr>
+          <a:xfrm>
+            <a:off x="463252" y="1012303"/>
+            <a:ext cx="8217496" cy="3770529"/>
+          </a:xfrm>
+          <a:prstGeom prst="rect">
+            <a:avLst/>
+          </a:prstGeom>
+          <a:ln w="12700">
+            <a:miter lim="400000"/>
+          </a:ln>
+        </p:spPr>
+      </p:pic>
+      <p:sp>
+        <p:nvSpPr>
+          <p:cNvPr id="154" name="Google Shape;95;p20"/>
+          <p:cNvSpPr txBox="1"/>
+          <p:nvPr>
+            <p:ph type="body" sz="quarter" idx="1"/>
+          </p:nvPr>
+        </p:nvSpPr>
+        <p:spPr>
+          <a:xfrm>
+            <a:off x="311699" y="301575"/>
+            <a:ext cx="8520602" cy="546101"/>
+          </a:xfrm>
+          <a:prstGeom prst="rect">
+            <a:avLst/>
+          </a:prstGeom>
+        </p:spPr>
+        <p:txBody>
+          <a:bodyPr/>
+          <a:lstStyle>
+            <a:lvl1pPr marL="0" indent="0" algn="ctr" defTabSz="557784">
+              <a:lnSpc>
+                <a:spcPct val="100000"/>
+              </a:lnSpc>
+              <a:buClrTx/>
+              <a:buSzTx/>
+              <a:buFontTx/>
+              <a:buNone/>
+              <a:defRPr sz="2562">
+                <a:solidFill>
+                  <a:srgbClr val="000000"/>
+                </a:solidFill>
+              </a:defRPr>
+            </a:lvl1pPr>
+          </a:lstStyle>
+          <a:p>
+            <a:pPr/>
+            <a:r>
+              <a:t>Google Search 2021-02-05 To 2021-02-15</a:t>
+            </a:r>
+          </a:p>
+        </p:txBody>
+      </p:sp>
+    </p:spTree>
+  </p:cSld>
+  <p:clrMapOvr>
+    <a:masterClrMapping/>
+  </p:clrMapOvr>
+  <mc:AlternateContent xmlns:mc="http://schemas.openxmlformats.org/markup-compatibility/2006">
+    <mc:Choice xmlns:p14="http://schemas.microsoft.com/office/powerpoint/2010/main" Requires="p14">
+      <p:transition spd="slow" advClick="1" p14:dur="1500">
+        <p14:doors dir="vert"/>
+      </p:transition>
+    </mc:Choice>
+    <mc:Fallback>
+      <p:transition spd="slow">
+        <p:fade/>
+      </p:transition>
+    </mc:Fallback>
+  </mc:AlternateContent>
+  <p:timing>
+    <p:tnLst>
+      <p:par>
+        <p:cTn id="1" nodeType="tmRoot" restart="never" dur="indefinite" fill="hold">
+          <p:childTnLst>
+            <p:seq concurrent="1" prevAc="none" nextAc="seek">
+              <p:cTn id="2" nodeType="mainSeq" dur="indefinite" fill="hold">
+                <p:childTnLst>
+                  <p:par>
+                    <p:cTn id="3" fill="hold">
+                      <p:stCondLst>
+                        <p:cond delay="indefinite"/>
+                        <p:cond evt="onBegin">
+                          <p:tn val="2"/>
+                        </p:cond>
+                      </p:stCondLst>
+                      <p:childTnLst>
+                        <p:par>
+                          <p:cTn id="4" fill="hold">
+                            <p:stCondLst>
+                              <p:cond delay="0"/>
+                            </p:stCondLst>
+                            <p:childTnLst>
+                              <p:par>
+                                <p:cTn id="5" presetClass="entr" nodeType="afterEffect" presetSubtype="5" presetID="3" grpId="1" fill="hold">
+                                  <p:stCondLst>
+                                    <p:cond delay="0"/>
+                                  </p:stCondLst>
+                                  <p:iterate type="el" backwards="0">
+                                    <p:tmAbs val="0"/>
+                                  </p:iterate>
+                                  <p:childTnLst>
+                                    <p:set>
+                                      <p:cBhvr>
+                                        <p:cTn id="6" fill="hold"/>
+                                        <p:tgtEl>
+                                          <p:spTgt spid="154"/>
+                                        </p:tgtEl>
+                                        <p:attrNameLst>
+                                          <p:attrName>style.visibility</p:attrName>
+                                        </p:attrNameLst>
+                                      </p:cBhvr>
+                                      <p:to>
+                                        <p:strVal val="visible"/>
+                                      </p:to>
+                                    </p:set>
+                                    <p:animEffect filter="blinds(vertical)" transition="in">
+                                      <p:cBhvr>
+                                        <p:cTn id="7" dur="1000"/>
+                                        <p:tgtEl>
+                                          <p:spTgt spid="154"/>
+                                        </p:tgtEl>
+                                      </p:cBhvr>
+                                    </p:animEffect>
+                                  </p:childTnLst>
+                                </p:cTn>
+                              </p:par>
+                            </p:childTnLst>
+                          </p:cTn>
+                        </p:par>
+                      </p:childTnLst>
+                    </p:cTn>
+                  </p:par>
+                  <p:par>
+                    <p:cTn id="8" fill="hold">
+                      <p:stCondLst>
+                        <p:cond delay="indefinite"/>
+                      </p:stCondLst>
+                      <p:childTnLst>
+                        <p:par>
+                          <p:cTn id="9" fill="hold">
+                            <p:stCondLst>
+                              <p:cond delay="0"/>
+                            </p:stCondLst>
+                            <p:childTnLst>
+                              <p:par>
+                                <p:cTn id="10" presetClass="entr" nodeType="clickEffect" presetID="9" grpId="2" fill="hold">
+                                  <p:stCondLst>
+                                    <p:cond delay="0"/>
+                                  </p:stCondLst>
+                                  <p:iterate type="el" backwards="0">
+                                    <p:tmAbs val="0"/>
+                                  </p:iterate>
+                                  <p:childTnLst>
+                                    <p:set>
+                                      <p:cBhvr>
+                                        <p:cTn id="11" fill="hold"/>
+                                        <p:tgtEl>
+                                          <p:spTgt spid="153"/>
+                                        </p:tgtEl>
+                                        <p:attrNameLst>
+                                          <p:attrName>style.visibility</p:attrName>
+                                        </p:attrNameLst>
+                                      </p:cBhvr>
+                                      <p:to>
+                                        <p:strVal val="visible"/>
+                                      </p:to>
+                                    </p:set>
+                                    <p:animEffect filter="dissolve" transition="in">
+                                      <p:cBhvr>
+                                        <p:cTn id="12" dur="1000"/>
+                                        <p:tgtEl>
+                                          <p:spTgt spid="153"/>
+                                        </p:tgtEl>
+                                      </p:cBhvr>
+                                    </p:animEffect>
+                                  </p:childTnLst>
+                                </p:cTn>
+                              </p:par>
+                            </p:childTnLst>
+                          </p:cTn>
+                        </p:par>
+                      </p:childTnLst>
+                    </p:cTn>
+                  </p:par>
+                </p:childTnLst>
+              </p:cTn>
+              <p:prevCondLst>
+                <p:cond evt="onPrev">
+                  <p:tgtEl>
+                    <p:sldTgt/>
+                  </p:tgtEl>
+                </p:cond>
+              </p:prevCondLst>
+              <p:nextCondLst>
+                <p:cond evt="onNext">
+                  <p:tgtEl>
+                    <p:sldTgt/>
+                  </p:tgtEl>
+                </p:cond>
+              </p:nextCondLst>
+            </p:seq>
+          </p:childTnLst>
+        </p:cTn>
+      </p:par>
+    </p:tnLst>
+    <p:bldLst>
+      <p:bldP build="whole" bldLvl="1" animBg="1" rev="0" advAuto="0" spid="153" grpId="2"/>
+      <p:bldP build="whole" bldLvl="1" animBg="1" rev="0" advAuto="0" spid="154" grpId="1"/>
+    </p:bldLst>
+  </p:timing>
+</p:sld>
+</file>
+
+<file path=ppt/slides/slide13.xml><?xml version="1.0" encoding="utf-8"?>
+<p:sld xmlns:a="http://schemas.openxmlformats.org/drawingml/2006/main" xmlns:r="http://schemas.openxmlformats.org/officeDocument/2006/relationships" xmlns:p="http://schemas.openxmlformats.org/presentationml/2006/main" xmlns:m="http://schemas.openxmlformats.org/officeDocument/2006/math" xmlns:a14="http://schemas.microsoft.com/office/drawing/2010/main" showMasterSp="1" showMasterPhAnim="1">
+  <p:cSld>
+    <p:bg>
+      <p:bgPr>
+        <a:gradFill flip="none" rotWithShape="1">
+          <a:gsLst>
+            <a:gs pos="0">
+              <a:srgbClr val="FCBD00"/>
+            </a:gs>
+            <a:gs pos="35000">
+              <a:srgbClr val="FFE4D1"/>
+            </a:gs>
+            <a:gs pos="100000">
+              <a:srgbClr val="FEDF98"/>
+            </a:gs>
+          </a:gsLst>
+          <a:lin ang="0" scaled="0"/>
+        </a:gradFill>
+      </p:bgPr>
+    </p:bg>
+    <p:spTree>
+      <p:nvGrpSpPr>
+        <p:cNvPr id="1" name=""/>
+        <p:cNvGrpSpPr/>
+        <p:nvPr/>
+      </p:nvGrpSpPr>
+      <p:grpSpPr>
+        <a:xfrm>
+          <a:off x="0" y="0"/>
+          <a:ext cx="0" cy="0"/>
+          <a:chOff x="0" y="0"/>
+          <a:chExt cx="0" cy="0"/>
+        </a:xfrm>
+      </p:grpSpPr>
+      <p:pic>
+        <p:nvPicPr>
+          <p:cNvPr id="156" name="Search_2021-05-10_2021-05-18.png" descr="Search_2021-05-10_2021-05-18.png"/>
+          <p:cNvPicPr>
+            <a:picLocks noChangeAspect="1"/>
+          </p:cNvPicPr>
+          <p:nvPr/>
+        </p:nvPicPr>
+        <p:blipFill>
+          <a:blip r:embed="rId2">
+            <a:extLst/>
+          </a:blip>
+          <a:stretch>
+            <a:fillRect/>
+          </a:stretch>
+        </p:blipFill>
+        <p:spPr>
+          <a:xfrm>
+            <a:off x="390597" y="949499"/>
+            <a:ext cx="8362806" cy="3837202"/>
+          </a:xfrm>
+          <a:prstGeom prst="rect">
+            <a:avLst/>
+          </a:prstGeom>
+          <a:ln w="12700">
+            <a:miter lim="400000"/>
+          </a:ln>
+        </p:spPr>
+      </p:pic>
+      <p:sp>
+        <p:nvSpPr>
+          <p:cNvPr id="157" name="Google Shape;95;p20"/>
+          <p:cNvSpPr txBox="1"/>
+          <p:nvPr>
+            <p:ph type="body" sz="quarter" idx="1"/>
+          </p:nvPr>
+        </p:nvSpPr>
+        <p:spPr>
+          <a:xfrm>
+            <a:off x="311699" y="301575"/>
+            <a:ext cx="8520602" cy="546101"/>
+          </a:xfrm>
+          <a:prstGeom prst="rect">
+            <a:avLst/>
+          </a:prstGeom>
+        </p:spPr>
+        <p:txBody>
+          <a:bodyPr/>
+          <a:lstStyle>
+            <a:lvl1pPr marL="0" indent="0" algn="ctr" defTabSz="557784">
+              <a:lnSpc>
+                <a:spcPct val="100000"/>
+              </a:lnSpc>
+              <a:buClrTx/>
+              <a:buSzTx/>
+              <a:buFontTx/>
+              <a:buNone/>
+              <a:defRPr sz="2562">
+                <a:solidFill>
+                  <a:srgbClr val="000000"/>
+                </a:solidFill>
+              </a:defRPr>
+            </a:lvl1pPr>
+          </a:lstStyle>
+          <a:p>
+            <a:pPr/>
+            <a:r>
+              <a:t>Google Search 2021-05-10 To 2021-05-18</a:t>
+            </a:r>
+          </a:p>
+        </p:txBody>
+      </p:sp>
+    </p:spTree>
+  </p:cSld>
+  <p:clrMapOvr>
+    <a:masterClrMapping/>
+  </p:clrMapOvr>
+  <mc:AlternateContent xmlns:mc="http://schemas.openxmlformats.org/markup-compatibility/2006">
+    <mc:Choice xmlns:p14="http://schemas.microsoft.com/office/powerpoint/2010/main" Requires="p14">
+      <p:transition spd="slow" advClick="1" p14:dur="1500">
+        <p:push dir="l"/>
+      </p:transition>
+    </mc:Choice>
+    <mc:Fallback>
+      <p:transition spd="slow">
+        <p:fade/>
+      </p:transition>
+    </mc:Fallback>
+  </mc:AlternateContent>
+  <p:timing>
+    <p:tnLst>
+      <p:par>
+        <p:cTn id="1" nodeType="tmRoot" restart="never" dur="indefinite" fill="hold">
+          <p:childTnLst>
+            <p:seq concurrent="1" prevAc="none" nextAc="seek">
+              <p:cTn id="2" nodeType="mainSeq" dur="indefinite" fill="hold">
+                <p:childTnLst>
+                  <p:par>
+                    <p:cTn id="3" fill="hold">
+                      <p:stCondLst>
+                        <p:cond delay="indefinite"/>
+                        <p:cond evt="onBegin">
+                          <p:tn val="2"/>
+                        </p:cond>
+                      </p:stCondLst>
+                      <p:childTnLst>
+                        <p:par>
+                          <p:cTn id="4" fill="hold">
+                            <p:stCondLst>
+                              <p:cond delay="0"/>
+                            </p:stCondLst>
+                            <p:childTnLst>
+                              <p:par>
+                                <p:cTn id="5" presetClass="entr" nodeType="afterEffect" presetSubtype="8" presetID="22" grpId="1" fill="hold">
+                                  <p:stCondLst>
+                                    <p:cond delay="0"/>
+                                  </p:stCondLst>
+                                  <p:iterate type="el" backwards="0">
+                                    <p:tmAbs val="0"/>
+                                  </p:iterate>
+                                  <p:childTnLst>
+                                    <p:set>
+                                      <p:cBhvr>
+                                        <p:cTn id="6" fill="hold"/>
+                                        <p:tgtEl>
+                                          <p:spTgt spid="157"/>
+                                        </p:tgtEl>
+                                        <p:attrNameLst>
+                                          <p:attrName>style.visibility</p:attrName>
+                                        </p:attrNameLst>
+                                      </p:cBhvr>
+                                      <p:to>
+                                        <p:strVal val="visible"/>
+                                      </p:to>
+                                    </p:set>
+                                    <p:animEffect filter="wipe(left)" transition="in">
+                                      <p:cBhvr>
+                                        <p:cTn id="7" dur="1000"/>
+                                        <p:tgtEl>
+                                          <p:spTgt spid="157"/>
+                                        </p:tgtEl>
+                                      </p:cBhvr>
+                                    </p:animEffect>
+                                  </p:childTnLst>
+                                </p:cTn>
+                              </p:par>
+                            </p:childTnLst>
+                          </p:cTn>
+                        </p:par>
+                      </p:childTnLst>
+                    </p:cTn>
+                  </p:par>
+                  <p:par>
+                    <p:cTn id="8" fill="hold">
+                      <p:stCondLst>
+                        <p:cond delay="indefinite"/>
+                      </p:stCondLst>
+                      <p:childTnLst>
+                        <p:par>
+                          <p:cTn id="9" fill="hold">
+                            <p:stCondLst>
+                              <p:cond delay="0"/>
+                            </p:stCondLst>
+                            <p:childTnLst>
+                              <p:par>
+                                <p:cTn id="10" presetClass="entr" nodeType="clickEffect" presetSubtype="8" presetID="15" grpId="2" fill="hold">
+                                  <p:stCondLst>
+                                    <p:cond delay="0"/>
+                                  </p:stCondLst>
+                                  <p:iterate type="el" backwards="0">
+                                    <p:tmAbs val="0"/>
+                                  </p:iterate>
+                                  <p:childTnLst>
+                                    <p:set>
+                                      <p:cBhvr>
+                                        <p:cTn id="11" fill="hold"/>
+                                        <p:tgtEl>
+                                          <p:spTgt spid="156"/>
+                                        </p:tgtEl>
+                                        <p:attrNameLst>
+                                          <p:attrName>style.visibility</p:attrName>
+                                        </p:attrNameLst>
+                                      </p:cBhvr>
+                                      <p:to>
+                                        <p:strVal val="visible"/>
+                                      </p:to>
+                                    </p:set>
+                                    <p:anim calcmode="lin" valueType="num">
+                                      <p:cBhvr>
+                                        <p:cTn id="12" dur="1000" fill="hold"/>
+                                        <p:tgtEl>
+                                          <p:spTgt spid="156"/>
+                                        </p:tgtEl>
+                                        <p:attrNameLst>
+                                          <p:attrName>ppt_w</p:attrName>
+                                        </p:attrNameLst>
+                                      </p:cBhvr>
+                                      <p:tavLst>
+                                        <p:tav tm="0">
+                                          <p:val>
+                                            <p:fltVal val="0"/>
+                                          </p:val>
+                                        </p:tav>
+                                        <p:tav tm="100000">
+                                          <p:val>
+                                            <p:strVal val="#ppt_w"/>
+                                          </p:val>
+                                        </p:tav>
+                                      </p:tavLst>
+                                    </p:anim>
+                                    <p:anim calcmode="lin" valueType="num">
+                                      <p:cBhvr>
+                                        <p:cTn id="13" dur="1000" fill="hold"/>
+                                        <p:tgtEl>
+                                          <p:spTgt spid="156"/>
+                                        </p:tgtEl>
+                                        <p:attrNameLst>
+                                          <p:attrName>ppt_h</p:attrName>
+                                        </p:attrNameLst>
+                                      </p:cBhvr>
+                                      <p:tavLst>
+                                        <p:tav tm="0">
+                                          <p:val>
+                                            <p:fltVal val="0"/>
+                                          </p:val>
+                                        </p:tav>
+                                        <p:tav tm="100000">
+                                          <p:val>
+                                            <p:strVal val="#ppt_h"/>
+                                          </p:val>
+                                        </p:tav>
+                                      </p:tavLst>
+                                    </p:anim>
+                                    <p:anim calcmode="lin" valueType="num">
+                                      <p:cBhvr>
+                                        <p:cTn id="14" dur="1000" fill="hold"/>
+                                        <p:tgtEl>
+                                          <p:spTgt spid="156"/>
+                                        </p:tgtEl>
+                                        <p:attrNameLst>
+                                          <p:attrName>ppt_x</p:attrName>
+                                        </p:attrNameLst>
+                                      </p:cBhvr>
+                                      <p:tavLst>
+                                        <p:tav tm="0" fmla="#ppt_x+(cos(-2*pi*(1-$))*-#ppt_x-sin(-2*pi*(1-$))*(1-#ppt_y))*(1-$)">
+                                          <p:val>
+                                            <p:fltVal val="0"/>
+                                          </p:val>
+                                        </p:tav>
+                                        <p:tav tm="100000">
+                                          <p:val>
+                                            <p:fltVal val="1"/>
+                                          </p:val>
+                                        </p:tav>
+                                      </p:tavLst>
+                                    </p:anim>
+                                    <p:anim calcmode="lin" valueType="num">
+                                      <p:cBhvr>
+                                        <p:cTn id="15" dur="1000" fill="hold"/>
+                                        <p:tgtEl>
+                                          <p:spTgt spid="156"/>
+                                        </p:tgtEl>
+                                        <p:attrNameLst>
+                                          <p:attrName>ppt_y</p:attrName>
+                                        </p:attrNameLst>
+                                      </p:cBhvr>
+                                      <p:tavLst>
+                                        <p:tav tm="0" fmla="#ppt_y+(sin(-2*pi*(1-$))*-#ppt_x+cos(-2*pi*(1-$))*(1-#ppt_y))*(1-$)">
+                                          <p:val>
+                                            <p:fltVal val="0"/>
+                                          </p:val>
+                                        </p:tav>
+                                        <p:tav tm="100000">
+                                          <p:val>
+                                            <p:fltVal val="1"/>
+                                          </p:val>
+                                        </p:tav>
+                                      </p:tavLst>
+                                    </p:anim>
+                                  </p:childTnLst>
+                                </p:cTn>
+                              </p:par>
+                            </p:childTnLst>
+                          </p:cTn>
+                        </p:par>
+                      </p:childTnLst>
+                    </p:cTn>
+                  </p:par>
+                </p:childTnLst>
+              </p:cTn>
+              <p:prevCondLst>
+                <p:cond evt="onPrev">
+                  <p:tgtEl>
+                    <p:sldTgt/>
+                  </p:tgtEl>
+                </p:cond>
+              </p:prevCondLst>
+              <p:nextCondLst>
+                <p:cond evt="onNext">
+                  <p:tgtEl>
+                    <p:sldTgt/>
+                  </p:tgtEl>
+                </p:cond>
+              </p:nextCondLst>
+            </p:seq>
+          </p:childTnLst>
+        </p:cTn>
+      </p:par>
+    </p:tnLst>
+    <p:bldLst>
+      <p:bldP build="whole" bldLvl="1" animBg="1" rev="0" advAuto="0" spid="156" grpId="2"/>
+      <p:bldP build="whole" bldLvl="1" animBg="1" rev="0" advAuto="0" spid="157" grpId="1"/>
+    </p:bldLst>
+  </p:timing>
+</p:sld>
+</file>
+
+<file path=ppt/slides/slide14.xml><?xml version="1.0" encoding="utf-8"?>
+<p:sld xmlns:a="http://schemas.openxmlformats.org/drawingml/2006/main" xmlns:r="http://schemas.openxmlformats.org/officeDocument/2006/relationships" xmlns:p="http://schemas.openxmlformats.org/presentationml/2006/main" xmlns:m="http://schemas.openxmlformats.org/officeDocument/2006/math" xmlns:a14="http://schemas.microsoft.com/office/drawing/2010/main" showMasterSp="1" showMasterPhAnim="1">
+  <p:cSld>
+    <p:bg>
+      <p:bgPr>
+        <a:gradFill flip="none" rotWithShape="1">
+          <a:gsLst>
+            <a:gs pos="0">
+              <a:srgbClr val="FCBD00"/>
+            </a:gs>
+            <a:gs pos="35000">
+              <a:srgbClr val="FFE4D1"/>
+            </a:gs>
+            <a:gs pos="100000">
+              <a:srgbClr val="FEDF98"/>
+            </a:gs>
+          </a:gsLst>
+          <a:lin ang="5400000" scaled="0"/>
+        </a:gradFill>
+      </p:bgPr>
+    </p:bg>
+    <p:spTree>
+      <p:nvGrpSpPr>
+        <p:cNvPr id="1" name=""/>
+        <p:cNvGrpSpPr/>
+        <p:nvPr/>
+      </p:nvGrpSpPr>
+      <p:grpSpPr>
+        <a:xfrm>
+          <a:off x="0" y="0"/>
+          <a:ext cx="0" cy="0"/>
+          <a:chOff x="0" y="0"/>
+          <a:chExt cx="0" cy="0"/>
+        </a:xfrm>
+      </p:grpSpPr>
+      <p:pic>
+        <p:nvPicPr>
+          <p:cNvPr id="159" name="Search_2021-05-17_2021-05-24.png" descr="Search_2021-05-17_2021-05-24.png"/>
+          <p:cNvPicPr>
+            <a:picLocks noChangeAspect="1"/>
+          </p:cNvPicPr>
+          <p:nvPr/>
+        </p:nvPicPr>
+        <p:blipFill>
+          <a:blip r:embed="rId2">
+            <a:extLst/>
+          </a:blip>
+          <a:stretch>
+            <a:fillRect/>
+          </a:stretch>
+        </p:blipFill>
+        <p:spPr>
+          <a:xfrm>
+            <a:off x="489478" y="961212"/>
+            <a:ext cx="8165044" cy="3746462"/>
+          </a:xfrm>
+          <a:prstGeom prst="rect">
+            <a:avLst/>
+          </a:prstGeom>
+          <a:ln w="12700">
+            <a:miter lim="400000"/>
+          </a:ln>
+        </p:spPr>
+      </p:pic>
+      <p:sp>
+        <p:nvSpPr>
+          <p:cNvPr id="160" name="Google Shape;95;p20"/>
+          <p:cNvSpPr txBox="1"/>
+          <p:nvPr>
+            <p:ph type="body" sz="quarter" idx="1"/>
+          </p:nvPr>
+        </p:nvSpPr>
+        <p:spPr>
+          <a:xfrm>
+            <a:off x="311699" y="301575"/>
+            <a:ext cx="8520602" cy="546101"/>
+          </a:xfrm>
+          <a:prstGeom prst="rect">
+            <a:avLst/>
+          </a:prstGeom>
+        </p:spPr>
+        <p:txBody>
+          <a:bodyPr/>
+          <a:lstStyle>
+            <a:lvl1pPr marL="0" indent="0" algn="ctr" defTabSz="557784">
+              <a:lnSpc>
+                <a:spcPct val="100000"/>
+              </a:lnSpc>
+              <a:buClrTx/>
+              <a:buSzTx/>
+              <a:buFontTx/>
+              <a:buNone/>
+              <a:defRPr sz="2562">
+                <a:solidFill>
+                  <a:srgbClr val="000000"/>
+                </a:solidFill>
+              </a:defRPr>
+            </a:lvl1pPr>
+          </a:lstStyle>
+          <a:p>
+            <a:pPr/>
+            <a:r>
+              <a:t>Google Search 2021-05-17 To 2021-05-24</a:t>
+            </a:r>
+          </a:p>
+        </p:txBody>
+      </p:sp>
+    </p:spTree>
+  </p:cSld>
+  <p:clrMapOvr>
+    <a:masterClrMapping/>
+  </p:clrMapOvr>
+  <mc:AlternateContent xmlns:mc="http://schemas.openxmlformats.org/markup-compatibility/2006">
+    <mc:Choice xmlns:p14="http://schemas.microsoft.com/office/powerpoint/2010/main" Requires="p14">
+      <p:transition spd="slow" advClick="1" p14:dur="1500">
+        <p14:flip dir="r"/>
+      </p:transition>
+    </mc:Choice>
+    <mc:Fallback>
+      <p:transition spd="slow">
+        <p:fade/>
+      </p:transition>
+    </mc:Fallback>
+  </mc:AlternateContent>
+  <p:timing>
+    <p:tnLst>
+      <p:par>
+        <p:cTn id="1" nodeType="tmRoot" restart="never" dur="indefinite" fill="hold">
+          <p:childTnLst>
+            <p:seq concurrent="1" prevAc="none" nextAc="seek">
+              <p:cTn id="2" nodeType="mainSeq" dur="indefinite" fill="hold">
+                <p:childTnLst>
+                  <p:par>
+                    <p:cTn id="3" fill="hold">
+                      <p:stCondLst>
+                        <p:cond delay="indefinite"/>
+                        <p:cond evt="onBegin">
+                          <p:tn val="2"/>
+                        </p:cond>
+                      </p:stCondLst>
+                      <p:childTnLst>
+                        <p:par>
+                          <p:cTn id="4" fill="hold">
+                            <p:stCondLst>
+                              <p:cond delay="0"/>
+                            </p:stCondLst>
+                            <p:childTnLst>
+                              <p:par>
+                                <p:cTn id="5" presetClass="entr" nodeType="afterEffect" presetID="10" grpId="1" fill="hold">
+                                  <p:stCondLst>
+                                    <p:cond delay="0"/>
+                                  </p:stCondLst>
+                                  <p:iterate type="el" backwards="0">
+                                    <p:tmAbs val="0"/>
+                                  </p:iterate>
+                                  <p:childTnLst>
+                                    <p:set>
+                                      <p:cBhvr>
+                                        <p:cTn id="6" fill="hold"/>
+                                        <p:tgtEl>
+                                          <p:spTgt spid="160"/>
+                                        </p:tgtEl>
+                                        <p:attrNameLst>
+                                          <p:attrName>style.visibility</p:attrName>
+                                        </p:attrNameLst>
+                                      </p:cBhvr>
+                                      <p:to>
+                                        <p:strVal val="visible"/>
+                                      </p:to>
+                                    </p:set>
+                                    <p:animEffect filter="fade" transition="in">
+                                      <p:cBhvr>
+                                        <p:cTn id="7" dur="1000"/>
+                                        <p:tgtEl>
+                                          <p:spTgt spid="160"/>
+                                        </p:tgtEl>
+                                      </p:cBhvr>
+                                    </p:animEffect>
+                                  </p:childTnLst>
+                                </p:cTn>
+                              </p:par>
+                            </p:childTnLst>
+                          </p:cTn>
+                        </p:par>
+                      </p:childTnLst>
+                    </p:cTn>
+                  </p:par>
+                  <p:par>
+                    <p:cTn id="8" fill="hold">
+                      <p:stCondLst>
+                        <p:cond delay="indefinite"/>
+                      </p:stCondLst>
+                      <p:childTnLst>
+                        <p:par>
+                          <p:cTn id="9" fill="hold">
+                            <p:stCondLst>
+                              <p:cond delay="0"/>
+                            </p:stCondLst>
+                            <p:childTnLst>
+                              <p:par>
+                                <p:cTn id="10" presetClass="entr" nodeType="clickEffect" presetSubtype="4" presetID="22" grpId="2" fill="hold">
+                                  <p:stCondLst>
+                                    <p:cond delay="0"/>
+                                  </p:stCondLst>
+                                  <p:iterate type="el" backwards="0">
+                                    <p:tmAbs val="0"/>
+                                  </p:iterate>
+                                  <p:childTnLst>
+                                    <p:set>
+                                      <p:cBhvr>
+                                        <p:cTn id="11" fill="hold"/>
+                                        <p:tgtEl>
+                                          <p:spTgt spid="159"/>
+                                        </p:tgtEl>
+                                        <p:attrNameLst>
+                                          <p:attrName>style.visibility</p:attrName>
+                                        </p:attrNameLst>
+                                      </p:cBhvr>
+                                      <p:to>
+                                        <p:strVal val="visible"/>
+                                      </p:to>
+                                    </p:set>
+                                    <p:animEffect filter="wipe(down)" transition="in">
+                                      <p:cBhvr>
+                                        <p:cTn id="12" dur="2500"/>
+                                        <p:tgtEl>
+                                          <p:spTgt spid="159"/>
+                                        </p:tgtEl>
+                                      </p:cBhvr>
+                                    </p:animEffect>
+                                  </p:childTnLst>
+                                </p:cTn>
+                              </p:par>
+                            </p:childTnLst>
+                          </p:cTn>
+                        </p:par>
+                      </p:childTnLst>
+                    </p:cTn>
+                  </p:par>
+                </p:childTnLst>
+              </p:cTn>
+              <p:prevCondLst>
+                <p:cond evt="onPrev">
+                  <p:tgtEl>
+                    <p:sldTgt/>
+                  </p:tgtEl>
+                </p:cond>
+              </p:prevCondLst>
+              <p:nextCondLst>
+                <p:cond evt="onNext">
+                  <p:tgtEl>
+                    <p:sldTgt/>
+                  </p:tgtEl>
+                </p:cond>
+              </p:nextCondLst>
+            </p:seq>
+          </p:childTnLst>
+        </p:cTn>
+      </p:par>
+    </p:tnLst>
+    <p:bldLst>
+      <p:bldP build="whole" bldLvl="1" animBg="1" rev="0" advAuto="0" spid="159" grpId="2"/>
+      <p:bldP build="whole" bldLvl="1" animBg="1" rev="0" advAuto="0" spid="160" grpId="1"/>
+    </p:bldLst>
+  </p:timing>
+</p:sld>
+</file>
+
+<file path=ppt/slides/slide15.xml><?xml version="1.0" encoding="utf-8"?>
+<p:sld xmlns:a="http://schemas.openxmlformats.org/drawingml/2006/main" xmlns:r="http://schemas.openxmlformats.org/officeDocument/2006/relationships" xmlns:p="http://schemas.openxmlformats.org/presentationml/2006/main" xmlns:m="http://schemas.openxmlformats.org/officeDocument/2006/math" xmlns:a14="http://schemas.microsoft.com/office/drawing/2010/main" showMasterSp="1" showMasterPhAnim="1">
+  <p:cSld>
+    <p:bg>
+      <p:bgPr>
+        <a:gradFill flip="none" rotWithShape="1">
+          <a:gsLst>
+            <a:gs pos="0">
+              <a:srgbClr val="FCBD00"/>
+            </a:gs>
+            <a:gs pos="35000">
+              <a:srgbClr val="FFE4D1"/>
+            </a:gs>
+            <a:gs pos="100000">
+              <a:srgbClr val="FEDF98"/>
+            </a:gs>
+          </a:gsLst>
+          <a:lin ang="10800000" scaled="0"/>
+        </a:gradFill>
+      </p:bgPr>
+    </p:bg>
+    <p:spTree>
+      <p:nvGrpSpPr>
+        <p:cNvPr id="1" name=""/>
+        <p:cNvGrpSpPr/>
+        <p:nvPr/>
+      </p:nvGrpSpPr>
+      <p:grpSpPr>
+        <a:xfrm>
+          <a:off x="0" y="0"/>
+          <a:ext cx="0" cy="0"/>
+          <a:chOff x="0" y="0"/>
+          <a:chExt cx="0" cy="0"/>
+        </a:xfrm>
+      </p:grpSpPr>
+      <p:pic>
+        <p:nvPicPr>
+          <p:cNvPr id="162" name="Search_2021-12-02_2021-12-14.png" descr="Search_2021-12-02_2021-12-14.png"/>
+          <p:cNvPicPr>
+            <a:picLocks noChangeAspect="1"/>
+          </p:cNvPicPr>
+          <p:nvPr/>
+        </p:nvPicPr>
+        <p:blipFill>
+          <a:blip r:embed="rId2">
+            <a:extLst/>
+          </a:blip>
+          <a:stretch>
+            <a:fillRect/>
+          </a:stretch>
+        </p:blipFill>
+        <p:spPr>
+          <a:xfrm>
+            <a:off x="491229" y="1042145"/>
+            <a:ext cx="8161542" cy="3744854"/>
+          </a:xfrm>
+          <a:prstGeom prst="rect">
+            <a:avLst/>
+          </a:prstGeom>
+          <a:ln w="12700">
+            <a:miter lim="400000"/>
+          </a:ln>
+        </p:spPr>
+      </p:pic>
+      <p:sp>
+        <p:nvSpPr>
+          <p:cNvPr id="163" name="Google Shape;95;p20"/>
+          <p:cNvSpPr txBox="1"/>
+          <p:nvPr>
+            <p:ph type="body" sz="quarter" idx="1"/>
+          </p:nvPr>
+        </p:nvSpPr>
+        <p:spPr>
+          <a:xfrm>
+            <a:off x="311699" y="301575"/>
+            <a:ext cx="8520602" cy="546101"/>
+          </a:xfrm>
+          <a:prstGeom prst="rect">
+            <a:avLst/>
+          </a:prstGeom>
+        </p:spPr>
+        <p:txBody>
+          <a:bodyPr/>
+          <a:lstStyle>
+            <a:lvl1pPr marL="0" indent="0" algn="ctr" defTabSz="557784">
+              <a:lnSpc>
+                <a:spcPct val="100000"/>
+              </a:lnSpc>
+              <a:buClrTx/>
+              <a:buSzTx/>
+              <a:buFontTx/>
+              <a:buNone/>
+              <a:defRPr sz="2562">
+                <a:solidFill>
+                  <a:srgbClr val="000000"/>
+                </a:solidFill>
+              </a:defRPr>
+            </a:lvl1pPr>
+          </a:lstStyle>
+          <a:p>
+            <a:pPr/>
+            <a:r>
+              <a:t>Google Search 2021-12-02 To 2021-12-14</a:t>
+            </a:r>
+          </a:p>
+        </p:txBody>
+      </p:sp>
+    </p:spTree>
+  </p:cSld>
+  <p:clrMapOvr>
+    <a:masterClrMapping/>
+  </p:clrMapOvr>
+  <mc:AlternateContent xmlns:mc="http://schemas.openxmlformats.org/markup-compatibility/2006">
+    <mc:Choice xmlns:p14="http://schemas.microsoft.com/office/powerpoint/2010/main" Requires="p14">
+      <p:transition spd="med" advClick="1" p14:dur="1000">
+        <p:push dir="l"/>
+      </p:transition>
+    </mc:Choice>
+    <mc:Fallback>
+      <p:transition spd="med">
+        <p:fade/>
+      </p:transition>
+    </mc:Fallback>
+  </mc:AlternateContent>
+  <p:timing>
+    <p:tnLst>
+      <p:par>
+        <p:cTn id="1" nodeType="tmRoot" restart="never" dur="indefinite" fill="hold">
+          <p:childTnLst>
+            <p:seq concurrent="1" prevAc="none" nextAc="seek">
+              <p:cTn id="2" nodeType="mainSeq" dur="indefinite" fill="hold">
+                <p:childTnLst>
+                  <p:par>
+                    <p:cTn id="3" fill="hold">
+                      <p:stCondLst>
+                        <p:cond delay="indefinite"/>
+                        <p:cond evt="onBegin">
+                          <p:tn val="2"/>
+                        </p:cond>
+                      </p:stCondLst>
+                      <p:childTnLst>
+                        <p:par>
+                          <p:cTn id="4" fill="hold">
+                            <p:stCondLst>
+                              <p:cond delay="0"/>
+                            </p:stCondLst>
+                            <p:childTnLst>
+                              <p:par>
+                                <p:cTn id="5" presetClass="entr" nodeType="afterEffect" presetSubtype="32" presetID="23" grpId="1" fill="hold">
+                                  <p:stCondLst>
+                                    <p:cond delay="0"/>
+                                  </p:stCondLst>
+                                  <p:iterate type="el" backwards="0">
+                                    <p:tmAbs val="0"/>
+                                  </p:iterate>
+                                  <p:childTnLst>
+                                    <p:set>
+                                      <p:cBhvr>
+                                        <p:cTn id="6" fill="hold"/>
+                                        <p:tgtEl>
+                                          <p:spTgt spid="163"/>
+                                        </p:tgtEl>
+                                        <p:attrNameLst>
+                                          <p:attrName>style.visibility</p:attrName>
+                                        </p:attrNameLst>
+                                      </p:cBhvr>
+                                      <p:to>
+                                        <p:strVal val="visible"/>
+                                      </p:to>
+                                    </p:set>
+                                    <p:anim calcmode="lin" valueType="num">
+                                      <p:cBhvr>
+                                        <p:cTn id="7" dur="1000" fill="hold"/>
+                                        <p:tgtEl>
+                                          <p:spTgt spid="163"/>
+                                        </p:tgtEl>
+                                        <p:attrNameLst>
+                                          <p:attrName>ppt_w</p:attrName>
+                                        </p:attrNameLst>
+                                      </p:cBhvr>
+                                      <p:tavLst>
+                                        <p:tav tm="0">
+                                          <p:val>
+                                            <p:strVal val="4*#ppt_w"/>
+                                          </p:val>
+                                        </p:tav>
+                                        <p:tav tm="100000">
+                                          <p:val>
+                                            <p:strVal val="#ppt_w"/>
+                                          </p:val>
+                                        </p:tav>
+                                      </p:tavLst>
+                                    </p:anim>
+                                    <p:anim calcmode="lin" valueType="num">
+                                      <p:cBhvr>
+                                        <p:cTn id="8" dur="1000" fill="hold"/>
+                                        <p:tgtEl>
+                                          <p:spTgt spid="163"/>
+                                        </p:tgtEl>
+                                        <p:attrNameLst>
+                                          <p:attrName>ppt_h</p:attrName>
+                                        </p:attrNameLst>
+                                      </p:cBhvr>
+                                      <p:tavLst>
+                                        <p:tav tm="0">
+                                          <p:val>
+                                            <p:strVal val="4*#ppt_h"/>
+                                          </p:val>
+                                        </p:tav>
+                                        <p:tav tm="100000">
+                                          <p:val>
+                                            <p:strVal val="#ppt_h"/>
+                                          </p:val>
+                                        </p:tav>
+                                      </p:tavLst>
+                                    </p:anim>
+                                  </p:childTnLst>
+                                </p:cTn>
+                              </p:par>
+                            </p:childTnLst>
+                          </p:cTn>
+                        </p:par>
+                      </p:childTnLst>
+                    </p:cTn>
+                  </p:par>
+                  <p:par>
+                    <p:cTn id="9" fill="hold">
+                      <p:stCondLst>
+                        <p:cond delay="indefinite"/>
+                      </p:stCondLst>
+                      <p:childTnLst>
+                        <p:par>
+                          <p:cTn id="10" fill="hold">
+                            <p:stCondLst>
+                              <p:cond delay="0"/>
+                            </p:stCondLst>
+                            <p:childTnLst>
+                              <p:par>
+                                <p:cTn id="11" presetClass="entr" nodeType="clickEffect" presetSubtype="1" presetID="2" grpId="2" fill="hold">
+                                  <p:stCondLst>
+                                    <p:cond delay="0"/>
+                                  </p:stCondLst>
+                                  <p:iterate type="el" backwards="0">
+                                    <p:tmAbs val="0"/>
+                                  </p:iterate>
+                                  <p:childTnLst>
+                                    <p:set>
+                                      <p:cBhvr>
+                                        <p:cTn id="12" fill="hold"/>
+                                        <p:tgtEl>
+                                          <p:spTgt spid="162"/>
+                                        </p:tgtEl>
+                                        <p:attrNameLst>
+                                          <p:attrName>style.visibility</p:attrName>
+                                        </p:attrNameLst>
+                                      </p:cBhvr>
+                                      <p:to>
+                                        <p:strVal val="visible"/>
+                                      </p:to>
+                                    </p:set>
+                                    <p:anim calcmode="lin" valueType="num">
+                                      <p:cBhvr>
+                                        <p:cTn id="13" dur="1500" fill="hold"/>
+                                        <p:tgtEl>
+                                          <p:spTgt spid="162"/>
+                                        </p:tgtEl>
+                                        <p:attrNameLst>
+                                          <p:attrName>ppt_x</p:attrName>
+                                        </p:attrNameLst>
+                                      </p:cBhvr>
+                                      <p:tavLst>
+                                        <p:tav tm="0">
+                                          <p:val>
+                                            <p:strVal val="#ppt_x"/>
+                                          </p:val>
+                                        </p:tav>
+                                        <p:tav tm="100000">
+                                          <p:val>
+                                            <p:strVal val="#ppt_x"/>
+                                          </p:val>
+                                        </p:tav>
+                                      </p:tavLst>
+                                    </p:anim>
+                                    <p:anim calcmode="lin" valueType="num">
+                                      <p:cBhvr>
+                                        <p:cTn id="14" dur="1500" fill="hold"/>
+                                        <p:tgtEl>
+                                          <p:spTgt spid="162"/>
+                                        </p:tgtEl>
+                                        <p:attrNameLst>
+                                          <p:attrName>ppt_y</p:attrName>
+                                        </p:attrNameLst>
+                                      </p:cBhvr>
+                                      <p:tavLst>
+                                        <p:tav tm="0">
+                                          <p:val>
+                                            <p:strVal val="0-#ppt_h/2"/>
+                                          </p:val>
+                                        </p:tav>
+                                        <p:tav tm="100000">
+                                          <p:val>
+                                            <p:strVal val="#ppt_y"/>
+                                          </p:val>
+                                        </p:tav>
+                                      </p:tavLst>
+                                    </p:anim>
+                                  </p:childTnLst>
+                                </p:cTn>
+                              </p:par>
+                            </p:childTnLst>
+                          </p:cTn>
+                        </p:par>
+                      </p:childTnLst>
+                    </p:cTn>
+                  </p:par>
+                </p:childTnLst>
+              </p:cTn>
+              <p:prevCondLst>
+                <p:cond evt="onPrev">
+                  <p:tgtEl>
+                    <p:sldTgt/>
+                  </p:tgtEl>
+                </p:cond>
+              </p:prevCondLst>
+              <p:nextCondLst>
+                <p:cond evt="onNext">
+                  <p:tgtEl>
+                    <p:sldTgt/>
+                  </p:tgtEl>
+                </p:cond>
+              </p:nextCondLst>
+            </p:seq>
+          </p:childTnLst>
+        </p:cTn>
+      </p:par>
+    </p:tnLst>
+    <p:bldLst>
+      <p:bldP build="whole" bldLvl="1" animBg="1" rev="0" advAuto="0" spid="162" grpId="2"/>
+      <p:bldP build="whole" bldLvl="1" animBg="1" rev="0" advAuto="0" spid="163" grpId="1"/>
+    </p:bldLst>
+  </p:timing>
+</p:sld>
+</file>
+
+<file path=ppt/slides/slide16.xml><?xml version="1.0" encoding="utf-8"?>
+<p:sld xmlns:a="http://schemas.openxmlformats.org/drawingml/2006/main" xmlns:r="http://schemas.openxmlformats.org/officeDocument/2006/relationships" xmlns:p="http://schemas.openxmlformats.org/presentationml/2006/main" xmlns:m="http://schemas.openxmlformats.org/officeDocument/2006/math" xmlns:a14="http://schemas.microsoft.com/office/drawing/2010/main" showMasterSp="1" showMasterPhAnim="1">
+  <p:cSld>
+    <p:bg>
+      <p:bgPr>
+        <a:gradFill flip="none" rotWithShape="1">
+          <a:gsLst>
+            <a:gs pos="0">
+              <a:srgbClr val="FCBD00"/>
+            </a:gs>
+            <a:gs pos="35000">
+              <a:srgbClr val="FFE4D1"/>
+            </a:gs>
+            <a:gs pos="100000">
+              <a:srgbClr val="FEDF98"/>
+            </a:gs>
+          </a:gsLst>
+          <a:lin ang="16200000" scaled="0"/>
+        </a:gradFill>
+      </p:bgPr>
+    </p:bg>
+    <p:spTree>
+      <p:nvGrpSpPr>
+        <p:cNvPr id="1" name=""/>
+        <p:cNvGrpSpPr/>
+        <p:nvPr/>
+      </p:nvGrpSpPr>
+      <p:grpSpPr>
+        <a:xfrm>
+          <a:off x="0" y="0"/>
+          <a:ext cx="0" cy="0"/>
+          <a:chOff x="0" y="0"/>
+          <a:chExt cx="0" cy="0"/>
+        </a:xfrm>
+      </p:grpSpPr>
+      <p:pic>
+        <p:nvPicPr>
+          <p:cNvPr id="165" name="Search_2022-06-10_2022-06-19.png" descr="Search_2022-06-10_2022-06-19.png"/>
+          <p:cNvPicPr>
+            <a:picLocks noChangeAspect="1"/>
+          </p:cNvPicPr>
+          <p:nvPr/>
+        </p:nvPicPr>
+        <p:blipFill>
+          <a:blip r:embed="rId2">
+            <a:extLst/>
+          </a:blip>
+          <a:stretch>
+            <a:fillRect/>
+          </a:stretch>
+        </p:blipFill>
+        <p:spPr>
+          <a:xfrm>
+            <a:off x="666430" y="1026066"/>
+            <a:ext cx="7811140" cy="3584076"/>
+          </a:xfrm>
+          <a:prstGeom prst="rect">
+            <a:avLst/>
+          </a:prstGeom>
+          <a:ln w="12700">
+            <a:miter lim="400000"/>
+          </a:ln>
+        </p:spPr>
+      </p:pic>
+      <p:sp>
+        <p:nvSpPr>
+          <p:cNvPr id="166" name="Google Shape;95;p20"/>
+          <p:cNvSpPr txBox="1"/>
+          <p:nvPr>
+            <p:ph type="body" sz="quarter" idx="1"/>
+          </p:nvPr>
+        </p:nvSpPr>
+        <p:spPr>
+          <a:xfrm>
+            <a:off x="311699" y="301575"/>
+            <a:ext cx="8520602" cy="546101"/>
+          </a:xfrm>
+          <a:prstGeom prst="rect">
+            <a:avLst/>
+          </a:prstGeom>
+        </p:spPr>
+        <p:txBody>
+          <a:bodyPr/>
+          <a:lstStyle>
+            <a:lvl1pPr marL="0" indent="0" algn="ctr" defTabSz="557784">
+              <a:lnSpc>
+                <a:spcPct val="100000"/>
+              </a:lnSpc>
+              <a:buClrTx/>
+              <a:buSzTx/>
+              <a:buFontTx/>
+              <a:buNone/>
+              <a:defRPr sz="2562">
+                <a:solidFill>
+                  <a:srgbClr val="000000"/>
+                </a:solidFill>
+              </a:defRPr>
+            </a:lvl1pPr>
+          </a:lstStyle>
+          <a:p>
+            <a:pPr/>
+            <a:r>
+              <a:t>Google Search 2022-06-10 To 2022-06-19</a:t>
+            </a:r>
+          </a:p>
+        </p:txBody>
+      </p:sp>
+    </p:spTree>
+  </p:cSld>
+  <p:clrMapOvr>
+    <a:masterClrMapping/>
+  </p:clrMapOvr>
+  <mc:AlternateContent xmlns:mc="http://schemas.openxmlformats.org/markup-compatibility/2006">
+    <mc:Choice xmlns:p14="http://schemas.microsoft.com/office/powerpoint/2010/main" Requires="p14">
+      <p:transition spd="slow" advClick="1" p14:dur="1500">
+        <p14:flip dir="r"/>
+      </p:transition>
+    </mc:Choice>
+    <mc:Fallback>
+      <p:transition spd="slow">
+        <p:fade/>
+      </p:transition>
+    </mc:Fallback>
+  </mc:AlternateContent>
+  <p:timing>
+    <p:tnLst>
+      <p:par>
+        <p:cTn id="1" nodeType="tmRoot" restart="never" dur="indefinite" fill="hold">
+          <p:childTnLst>
+            <p:seq concurrent="1" prevAc="none" nextAc="seek">
+              <p:cTn id="2" nodeType="mainSeq" dur="indefinite" fill="hold">
+                <p:childTnLst>
+                  <p:par>
+                    <p:cTn id="3" fill="hold">
+                      <p:stCondLst>
+                        <p:cond delay="indefinite"/>
+                        <p:cond evt="onBegin">
+                          <p:tn val="2"/>
+                        </p:cond>
+                      </p:stCondLst>
+                      <p:childTnLst>
+                        <p:par>
+                          <p:cTn id="4" fill="hold">
+                            <p:stCondLst>
+                              <p:cond delay="0"/>
+                            </p:stCondLst>
+                            <p:childTnLst>
+                              <p:par>
+                                <p:cTn id="5" presetClass="entr" nodeType="afterEffect" presetID="10" grpId="1" fill="hold">
+                                  <p:stCondLst>
+                                    <p:cond delay="0"/>
+                                  </p:stCondLst>
+                                  <p:iterate type="lt" backwards="0">
+                                    <p:tmAbs val="0"/>
+                                  </p:iterate>
+                                  <p:childTnLst>
+                                    <p:set>
+                                      <p:cBhvr>
+                                        <p:cTn id="6" fill="hold"/>
+                                        <p:tgtEl>
+                                          <p:spTgt spid="166"/>
+                                        </p:tgtEl>
+                                        <p:attrNameLst>
+                                          <p:attrName>style.visibility</p:attrName>
+                                        </p:attrNameLst>
+                                      </p:cBhvr>
+                                      <p:to>
+                                        <p:strVal val="visible"/>
+                                      </p:to>
+                                    </p:set>
+                                    <p:animEffect filter="fade" transition="in">
+                                      <p:cBhvr>
+                                        <p:cTn id="7" dur="1000"/>
+                                        <p:tgtEl>
+                                          <p:spTgt spid="166"/>
+                                        </p:tgtEl>
+                                      </p:cBhvr>
+                                    </p:animEffect>
+                                  </p:childTnLst>
+                                </p:cTn>
+                              </p:par>
+                            </p:childTnLst>
+                          </p:cTn>
+                        </p:par>
+                      </p:childTnLst>
+                    </p:cTn>
+                  </p:par>
+                  <p:par>
+                    <p:cTn id="8" fill="hold">
+                      <p:stCondLst>
+                        <p:cond delay="indefinite"/>
+                      </p:stCondLst>
+                      <p:childTnLst>
+                        <p:par>
+                          <p:cTn id="9" fill="hold">
+                            <p:stCondLst>
+                              <p:cond delay="0"/>
+                            </p:stCondLst>
+                            <p:childTnLst>
+                              <p:par>
+                                <p:cTn id="10" presetClass="entr" nodeType="clickEffect" presetSubtype="1" presetID="2" grpId="2" fill="hold">
+                                  <p:stCondLst>
+                                    <p:cond delay="0"/>
+                                  </p:stCondLst>
+                                  <p:iterate type="el" backwards="0">
+                                    <p:tmAbs val="0"/>
+                                  </p:iterate>
+                                  <p:childTnLst>
+                                    <p:set>
+                                      <p:cBhvr>
+                                        <p:cTn id="11" fill="hold"/>
+                                        <p:tgtEl>
+                                          <p:spTgt spid="165"/>
+                                        </p:tgtEl>
+                                        <p:attrNameLst>
+                                          <p:attrName>style.visibility</p:attrName>
+                                        </p:attrNameLst>
+                                      </p:cBhvr>
+                                      <p:to>
+                                        <p:strVal val="visible"/>
+                                      </p:to>
+                                    </p:set>
+                                    <p:anim calcmode="lin" valueType="num">
+                                      <p:cBhvr>
+                                        <p:cTn id="12" dur="3000" fill="hold"/>
+                                        <p:tgtEl>
+                                          <p:spTgt spid="165"/>
+                                        </p:tgtEl>
+                                        <p:attrNameLst>
+                                          <p:attrName>ppt_x</p:attrName>
+                                        </p:attrNameLst>
+                                      </p:cBhvr>
+                                      <p:tavLst>
+                                        <p:tav tm="0">
+                                          <p:val>
+                                            <p:strVal val="#ppt_x"/>
+                                          </p:val>
+                                        </p:tav>
+                                        <p:tav tm="100000">
+                                          <p:val>
+                                            <p:strVal val="#ppt_x"/>
+                                          </p:val>
+                                        </p:tav>
+                                      </p:tavLst>
+                                    </p:anim>
+                                    <p:anim calcmode="lin" valueType="num">
+                                      <p:cBhvr>
+                                        <p:cTn id="13" dur="3000" fill="hold"/>
+                                        <p:tgtEl>
+                                          <p:spTgt spid="165"/>
+                                        </p:tgtEl>
+                                        <p:attrNameLst>
+                                          <p:attrName>ppt_y</p:attrName>
+                                        </p:attrNameLst>
+                                      </p:cBhvr>
+                                      <p:tavLst>
+                                        <p:tav tm="0">
+                                          <p:val>
+                                            <p:strVal val="0-#ppt_h/2"/>
+                                          </p:val>
+                                        </p:tav>
+                                        <p:tav tm="100000">
+                                          <p:val>
+                                            <p:strVal val="#ppt_y"/>
+                                          </p:val>
+                                        </p:tav>
+                                      </p:tavLst>
+                                    </p:anim>
+                                  </p:childTnLst>
+                                </p:cTn>
+                              </p:par>
+                            </p:childTnLst>
+                          </p:cTn>
+                        </p:par>
+                      </p:childTnLst>
+                    </p:cTn>
+                  </p:par>
+                </p:childTnLst>
+              </p:cTn>
+              <p:prevCondLst>
+                <p:cond evt="onPrev">
+                  <p:tgtEl>
+                    <p:sldTgt/>
+                  </p:tgtEl>
+                </p:cond>
+              </p:prevCondLst>
+              <p:nextCondLst>
+                <p:cond evt="onNext">
+                  <p:tgtEl>
+                    <p:sldTgt/>
+                  </p:tgtEl>
+                </p:cond>
+              </p:nextCondLst>
+            </p:seq>
+          </p:childTnLst>
+        </p:cTn>
+      </p:par>
+    </p:tnLst>
+    <p:bldLst>
+      <p:bldP build="whole" bldLvl="1" animBg="1" rev="0" advAuto="0" spid="166" grpId="1"/>
+      <p:bldP build="whole" bldLvl="1" animBg="1" rev="0" advAuto="0" spid="165" grpId="2"/>
+    </p:bldLst>
+  </p:timing>
+</p:sld>
+</file>
+
+<file path=ppt/slides/slide17.xml><?xml version="1.0" encoding="utf-8"?>
+<p:sld xmlns:a="http://schemas.openxmlformats.org/drawingml/2006/main" xmlns:r="http://schemas.openxmlformats.org/officeDocument/2006/relationships" xmlns:p="http://schemas.openxmlformats.org/presentationml/2006/main" xmlns:m="http://schemas.openxmlformats.org/officeDocument/2006/math" xmlns:a14="http://schemas.microsoft.com/office/drawing/2010/main" showMasterSp="1" showMasterPhAnim="1">
+  <p:cSld>
+    <p:bg>
+      <p:bgPr>
+        <a:gradFill flip="none" rotWithShape="1">
+          <a:gsLst>
+            <a:gs pos="0">
+              <a:srgbClr val="FCBD00"/>
+            </a:gs>
+            <a:gs pos="35000">
+              <a:srgbClr val="FFE4D1"/>
+            </a:gs>
+            <a:gs pos="100000">
+              <a:srgbClr val="FEDF98"/>
+            </a:gs>
+          </a:gsLst>
+          <a:lin ang="0" scaled="0"/>
+        </a:gradFill>
+      </p:bgPr>
+    </p:bg>
+    <p:spTree>
+      <p:nvGrpSpPr>
+        <p:cNvPr id="1" name=""/>
+        <p:cNvGrpSpPr/>
+        <p:nvPr/>
+      </p:nvGrpSpPr>
+      <p:grpSpPr>
+        <a:xfrm>
+          <a:off x="0" y="0"/>
+          <a:ext cx="0" cy="0"/>
+          <a:chOff x="0" y="0"/>
+          <a:chExt cx="0" cy="0"/>
+        </a:xfrm>
+      </p:grpSpPr>
+      <p:sp>
+        <p:nvSpPr>
+          <p:cNvPr id="168" name="Google Shape;95;p20"/>
+          <p:cNvSpPr txBox="1"/>
+          <p:nvPr>
+            <p:ph type="body" sz="quarter" idx="1"/>
+          </p:nvPr>
+        </p:nvSpPr>
+        <p:spPr>
+          <a:xfrm>
+            <a:off x="311699" y="301575"/>
+            <a:ext cx="8520602" cy="546101"/>
+          </a:xfrm>
+          <a:prstGeom prst="rect">
+            <a:avLst/>
+          </a:prstGeom>
+        </p:spPr>
+        <p:txBody>
+          <a:bodyPr/>
+          <a:lstStyle>
+            <a:lvl1pPr marL="0" indent="0" algn="ctr" defTabSz="557784">
+              <a:lnSpc>
+                <a:spcPct val="100000"/>
+              </a:lnSpc>
+              <a:buClrTx/>
+              <a:buSzTx/>
+              <a:buFontTx/>
+              <a:buNone/>
+              <a:defRPr sz="2562">
+                <a:solidFill>
+                  <a:srgbClr val="000000"/>
+                </a:solidFill>
+              </a:defRPr>
+            </a:lvl1pPr>
+          </a:lstStyle>
+          <a:p>
+            <a:pPr/>
+            <a:r>
               <a:t>Conclusion</a:t>
             </a:r>
           </a:p>
@@ -3287,7 +5413,7 @@
       </p:sp>
       <p:sp>
         <p:nvSpPr>
-          <p:cNvPr id="148" name="Only with in the past couple years has a correlation between stocks and Bitcoin begun to be seen"/>
+          <p:cNvPr id="169" name="Only with in the past couple years has a correlation between stocks and Bitcoin begun to be seen"/>
           <p:cNvSpPr txBox="1"/>
           <p:nvPr/>
         </p:nvSpPr>
@@ -3344,14 +5470,14 @@
       </p:sp>
       <p:sp>
         <p:nvSpPr>
-          <p:cNvPr id="149" name="In 2021 the increase in institutional investment and VC firm investment could be the cause."/>
+          <p:cNvPr id="170" name="2021 brought an increase in institutional investment and VC firm investment could be the cause."/>
           <p:cNvSpPr txBox="1"/>
           <p:nvPr/>
         </p:nvSpPr>
         <p:spPr>
           <a:xfrm>
             <a:off x="311699" y="1719523"/>
-            <a:ext cx="8520602" cy="546101"/>
+            <a:ext cx="8610395" cy="546101"/>
           </a:xfrm>
           <a:prstGeom prst="rect">
             <a:avLst/>
@@ -3370,7 +5496,7 @@
             <a:normAutofit fontScale="100000" lnSpcReduction="0"/>
           </a:bodyPr>
           <a:lstStyle>
-            <a:lvl1pPr marL="393192" indent="-294894" defTabSz="786384">
+            <a:lvl1pPr marL="374904" indent="-281177" defTabSz="749808">
               <a:lnSpc>
                 <a:spcPct val="115000"/>
               </a:lnSpc>
@@ -3379,10 +5505,10 @@
                   <a:lumOff val="21764"/>
                 </a:schemeClr>
               </a:buClr>
-              <a:buSzPts val="1500"/>
+              <a:buSzPts val="1400"/>
               <a:buFont typeface="Arial"/>
               <a:buChar char="●"/>
-              <a:defRPr sz="1548">
+              <a:defRPr sz="1476">
                 <a:solidFill>
                   <a:schemeClr val="accent2">
                     <a:lumOff val="21764"/>
@@ -3394,20 +5520,20 @@
           <a:p>
             <a:pPr/>
             <a:r>
-              <a:t>In 2021 the increase in institutional investment and VC firm investment could be the cause.</a:t>
+              <a:t>2021 brought an increase in institutional investment and VC firm investment could be the cause.</a:t>
             </a:r>
           </a:p>
         </p:txBody>
       </p:sp>
       <p:sp>
         <p:nvSpPr>
-          <p:cNvPr id="150" name="Using the Pytrends Api we where able to see price movement around searches for Bitcoin."/>
+          <p:cNvPr id="171" name="Using the Pytrends Api we where able to see price movement around searches for Bitcoin."/>
           <p:cNvSpPr txBox="1"/>
           <p:nvPr/>
         </p:nvSpPr>
         <p:spPr>
           <a:xfrm>
-            <a:off x="311699" y="2128059"/>
+            <a:off x="311699" y="2674159"/>
             <a:ext cx="8520602" cy="546101"/>
           </a:xfrm>
           <a:prstGeom prst="rect">
@@ -3458,14 +5584,71 @@
       </p:sp>
       <p:sp>
         <p:nvSpPr>
-          <p:cNvPr id="151" name="The price movements and search trends can normally be traced back to major events in the cryptocurrency world."/>
+          <p:cNvPr id="172" name="The price movements and search trends can normally be traced back to major events."/>
           <p:cNvSpPr txBox="1"/>
           <p:nvPr/>
         </p:nvSpPr>
         <p:spPr>
           <a:xfrm>
-            <a:off x="311699" y="2590666"/>
+            <a:off x="311699" y="2997066"/>
             <a:ext cx="8520602" cy="645724"/>
+          </a:xfrm>
+          <a:prstGeom prst="rect">
+            <a:avLst/>
+          </a:prstGeom>
+          <a:ln w="12700">
+            <a:miter lim="400000"/>
+          </a:ln>
+          <a:extLst>
+            <a:ext uri="{C572A759-6A51-4108-AA02-DFA0A04FC94B}">
+              <ma14:wrappingTextBoxFlag xmlns:ma14="http://schemas.microsoft.com/office/mac/drawingml/2011/main" val="1"/>
+            </a:ext>
+          </a:extLst>
+        </p:spPr>
+        <p:txBody>
+          <a:bodyPr lIns="91424" tIns="91424" rIns="91424" bIns="91424">
+            <a:normAutofit fontScale="100000" lnSpcReduction="0"/>
+          </a:bodyPr>
+          <a:lstStyle>
+            <a:lvl1pPr marL="411479" indent="-308609" defTabSz="822959">
+              <a:lnSpc>
+                <a:spcPct val="115000"/>
+              </a:lnSpc>
+              <a:buClr>
+                <a:schemeClr val="accent2">
+                  <a:lumOff val="21764"/>
+                </a:schemeClr>
+              </a:buClr>
+              <a:buSzPts val="1600"/>
+              <a:buFont typeface="Arial"/>
+              <a:buChar char="●"/>
+              <a:defRPr sz="1619">
+                <a:solidFill>
+                  <a:schemeClr val="accent2">
+                    <a:lumOff val="21764"/>
+                  </a:schemeClr>
+                </a:solidFill>
+              </a:defRPr>
+            </a:lvl1pPr>
+          </a:lstStyle>
+          <a:p>
+            <a:pPr/>
+            <a:r>
+              <a:t>The price movements and search trends can normally be traced back to major events. </a:t>
+            </a:r>
+          </a:p>
+        </p:txBody>
+      </p:sp>
+      <p:sp>
+        <p:nvSpPr>
+          <p:cNvPr id="173" name="Bitcoin’s correlations tend to move to different industries over time."/>
+          <p:cNvSpPr txBox="1"/>
+          <p:nvPr/>
+        </p:nvSpPr>
+        <p:spPr>
+          <a:xfrm>
+            <a:off x="311699" y="2412866"/>
+            <a:ext cx="6261440" cy="645724"/>
           </a:xfrm>
           <a:prstGeom prst="rect">
             <a:avLst/>
@@ -3508,7 +5691,116 @@
           <a:p>
             <a:pPr/>
             <a:r>
-              <a:t>The price movements and search trends can normally be traced back to major events in the cryptocurrency world. </a:t>
+              <a:t>Bitcoin’s correlations tend to move to different industries over time.</a:t>
+            </a:r>
+          </a:p>
+        </p:txBody>
+      </p:sp>
+      <p:sp>
+        <p:nvSpPr>
+          <p:cNvPr id="174" name="In Oct 2014 there was some correlation with oil but diverged by Jun 2015"/>
+          <p:cNvSpPr txBox="1"/>
+          <p:nvPr/>
+        </p:nvSpPr>
+        <p:spPr>
+          <a:xfrm>
+            <a:off x="311699" y="2071021"/>
+            <a:ext cx="7007317" cy="645724"/>
+          </a:xfrm>
+          <a:prstGeom prst="rect">
+            <a:avLst/>
+          </a:prstGeom>
+          <a:ln w="12700">
+            <a:miter lim="400000"/>
+          </a:ln>
+          <a:extLst>
+            <a:ext uri="{C572A759-6A51-4108-AA02-DFA0A04FC94B}">
+              <ma14:wrappingTextBoxFlag xmlns:ma14="http://schemas.microsoft.com/office/mac/drawingml/2011/main" val="1"/>
+            </a:ext>
+          </a:extLst>
+        </p:spPr>
+        <p:txBody>
+          <a:bodyPr lIns="91424" tIns="91424" rIns="91424" bIns="91424">
+            <a:normAutofit fontScale="100000" lnSpcReduction="0"/>
+          </a:bodyPr>
+          <a:lstStyle>
+            <a:lvl1pPr marL="393192" indent="-294894" defTabSz="786384">
+              <a:lnSpc>
+                <a:spcPct val="115000"/>
+              </a:lnSpc>
+              <a:buClr>
+                <a:schemeClr val="accent2">
+                  <a:lumOff val="21764"/>
+                </a:schemeClr>
+              </a:buClr>
+              <a:buSzPts val="1500"/>
+              <a:buFont typeface="Arial"/>
+              <a:buChar char="●"/>
+              <a:defRPr sz="1548">
+                <a:solidFill>
+                  <a:schemeClr val="accent2">
+                    <a:lumOff val="21764"/>
+                  </a:schemeClr>
+                </a:solidFill>
+              </a:defRPr>
+            </a:lvl1pPr>
+          </a:lstStyle>
+          <a:p>
+            <a:pPr/>
+            <a:r>
+              <a:t>In Oct 2014 there was some correlation with oil but diverged by Jun 2015</a:t>
+            </a:r>
+          </a:p>
+        </p:txBody>
+      </p:sp>
+      <p:sp>
+        <p:nvSpPr>
+          <p:cNvPr id="175" name="Google Shape;95;p20"/>
+          <p:cNvSpPr txBox="1"/>
+          <p:nvPr/>
+        </p:nvSpPr>
+        <p:spPr>
+          <a:xfrm>
+            <a:off x="311699" y="3628795"/>
+            <a:ext cx="8520602" cy="546101"/>
+          </a:xfrm>
+          <a:prstGeom prst="rect">
+            <a:avLst/>
+          </a:prstGeom>
+          <a:ln w="12700">
+            <a:miter lim="400000"/>
+          </a:ln>
+          <a:extLst>
+            <a:ext uri="{C572A759-6A51-4108-AA02-DFA0A04FC94B}">
+              <ma14:wrappingTextBoxFlag xmlns:ma14="http://schemas.microsoft.com/office/mac/drawingml/2011/main" val="1"/>
+            </a:ext>
+          </a:extLst>
+        </p:spPr>
+        <p:txBody>
+          <a:bodyPr lIns="91424" tIns="91424" rIns="91424" bIns="91424">
+            <a:normAutofit fontScale="100000" lnSpcReduction="0"/>
+          </a:bodyPr>
+          <a:lstStyle/>
+          <a:p>
+            <a:pPr algn="ctr" defTabSz="493776">
+              <a:defRPr sz="2268"/>
+            </a:pPr>
+            <a:r>
+              <a:t>Github repository </a:t>
+            </a:r>
+            <a:r>
+              <a:rPr u="sng">
+                <a:solidFill>
+                  <a:schemeClr val="accent5"/>
+                </a:solidFill>
+                <a:uFill>
+                  <a:solidFill>
+                    <a:schemeClr val="accent5"/>
+                  </a:solidFill>
+                </a:uFill>
+                <a:hlinkClick r:id="rId2" invalidUrl="" action="" tgtFrame="" tooltip="" history="1" highlightClick="0" endSnd="0"/>
+              </a:rPr>
+              <a:t>https://github.com/Olegreg762/group_project_1</a:t>
             </a:r>
           </a:p>
         </p:txBody>
@@ -3520,12 +5812,12 @@
   </p:clrMapOvr>
   <mc:AlternateContent xmlns:mc="http://schemas.openxmlformats.org/markup-compatibility/2006">
     <mc:Choice xmlns:p14="http://schemas.microsoft.com/office/powerpoint/2010/main" Requires="p14">
-      <p:transition spd="med" advClick="1" p14:dur="1000">
+      <p:transition spd="slow" advClick="1" p14:dur="1500">
         <p:dissolve/>
       </p:transition>
     </mc:Choice>
     <mc:Fallback>
-      <p:transition spd="med">
+      <p:transition spd="slow">
         <p:fade/>
       </p:transition>
     </mc:Fallback>
@@ -3554,7 +5846,7 @@
                             </p:stCondLst>
                             <p:childTnLst>
                               <p:par>
-                                <p:cTn id="5" presetClass="entr" nodeType="afterEffect" presetSubtype="32" presetID="23" grpId="1" fill="hold">
+                                <p:cTn id="5" presetClass="entr" nodeType="afterEffect" presetID="9" grpId="1" fill="hold">
                                   <p:stCondLst>
                                     <p:cond delay="0"/>
                                   </p:stCondLst>
@@ -3566,7 +5858,59 @@
                                       <p:cBhvr>
                                         <p:cTn id="6" fill="hold"/>
                                         <p:tgtEl>
-                                          <p:spTgt spid="147"/>
+                                          <p:spTgt spid="168"/>
+                                        </p:tgtEl>
+                                        <p:attrNameLst>
+                                          <p:attrName>style.visibility</p:attrName>
+                                        </p:attrNameLst>
+                                      </p:cBhvr>
+                                      <p:to>
+                                        <p:strVal val="visible"/>
+                                      </p:to>
+                                    </p:set>
+                                    <p:animEffect filter="dissolve" transition="in">
+                                      <p:cBhvr>
+                                        <p:cTn id="7" dur="4250"/>
+                                        <p:tgtEl>
+                                          <p:spTgt spid="168"/>
+                                        </p:tgtEl>
+                                      </p:cBhvr>
+                                    </p:animEffect>
+                                  </p:childTnLst>
+                                </p:cTn>
+                              </p:par>
+                            </p:childTnLst>
+                          </p:cTn>
+                        </p:par>
+                      </p:childTnLst>
+                    </p:cTn>
+                  </p:par>
+                  <p:par>
+                    <p:cTn id="8" fill="hold">
+                      <p:stCondLst>
+                        <p:cond delay="indefinite"/>
+                      </p:stCondLst>
+                      <p:childTnLst>
+                        <p:par>
+                          <p:cTn id="9" fill="hold">
+                            <p:stCondLst>
+                              <p:cond delay="0"/>
+                            </p:stCondLst>
+                            <p:childTnLst>
+                              <p:par>
+                                <p:cTn id="10" presetClass="entr" nodeType="clickEffect" presetSubtype="10" presetID="19" grpId="2" fill="hold">
+                                  <p:stCondLst>
+                                    <p:cond delay="0"/>
+                                  </p:stCondLst>
+                                  <p:iterate type="el" backwards="0">
+                                    <p:tmAbs val="0"/>
+                                  </p:iterate>
+                                  <p:childTnLst>
+                                    <p:set>
+                                      <p:cBhvr>
+                                        <p:cTn id="11" fill="hold"/>
+                                        <p:tgtEl>
+                                          <p:spTgt spid="169"/>
                                         </p:tgtEl>
                                         <p:attrNameLst>
                                           <p:attrName>style.visibility</p:attrName>
@@ -3578,32 +5922,32 @@
                                     </p:set>
                                     <p:anim calcmode="lin" valueType="num">
                                       <p:cBhvr>
-                                        <p:cTn id="7" dur="1000" fill="hold"/>
-                                        <p:tgtEl>
-                                          <p:spTgt spid="147"/>
+                                        <p:cTn id="12" dur="1500" fill="hold"/>
+                                        <p:tgtEl>
+                                          <p:spTgt spid="169"/>
                                         </p:tgtEl>
                                         <p:attrNameLst>
                                           <p:attrName>ppt_w</p:attrName>
                                         </p:attrNameLst>
                                       </p:cBhvr>
                                       <p:tavLst>
-                                        <p:tav tm="0">
-                                          <p:val>
-                                            <p:strVal val="4*#ppt_w"/>
+                                        <p:tav tm="0" fmla="#ppt_w*sin(2.5*pi*$)">
+                                          <p:val>
+                                            <p:fltVal val="0"/>
                                           </p:val>
                                         </p:tav>
                                         <p:tav tm="100000">
                                           <p:val>
-                                            <p:strVal val="#ppt_w"/>
+                                            <p:fltVal val="1"/>
                                           </p:val>
                                         </p:tav>
                                       </p:tavLst>
                                     </p:anim>
                                     <p:anim calcmode="lin" valueType="num">
                                       <p:cBhvr>
-                                        <p:cTn id="8" dur="1000" fill="hold"/>
-                                        <p:tgtEl>
-                                          <p:spTgt spid="147"/>
+                                        <p:cTn id="13" dur="1500" fill="hold"/>
+                                        <p:tgtEl>
+                                          <p:spTgt spid="169"/>
                                         </p:tgtEl>
                                         <p:attrNameLst>
                                           <p:attrName>ppt_h</p:attrName>
@@ -3612,7 +5956,7 @@
                                       <p:tavLst>
                                         <p:tav tm="0">
                                           <p:val>
-                                            <p:strVal val="4*#ppt_h"/>
+                                            <p:strVal val="#ppt_h"/>
                                           </p:val>
                                         </p:tav>
                                         <p:tav tm="100000">
@@ -3632,31 +5976,31 @@
                     </p:cTn>
                   </p:par>
                   <p:par>
-                    <p:cTn id="9" fill="hold">
+                    <p:cTn id="14" fill="hold">
                       <p:stCondLst>
                         <p:cond delay="indefinite"/>
                       </p:stCondLst>
                       <p:childTnLst>
                         <p:par>
-                          <p:cTn id="10" fill="hold">
+                          <p:cTn id="15" fill="hold">
                             <p:stCondLst>
                               <p:cond delay="0"/>
                             </p:stCondLst>
                             <p:childTnLst>
                               <p:par>
-                                <p:cTn id="11" presetClass="entr" nodeType="clickEffect" presetSubtype="10" presetID="19" grpId="2" fill="hold">
+                                <p:cTn id="16" presetClass="entr" nodeType="clickEffect" presetSubtype="0" presetID="2" grpId="3" fill="hold">
                                   <p:stCondLst>
                                     <p:cond delay="0"/>
                                   </p:stCondLst>
-                                  <p:iterate type="el" backwards="0">
+                                  <p:iterate type="lt" backwards="0">
                                     <p:tmAbs val="0"/>
                                   </p:iterate>
                                   <p:childTnLst>
                                     <p:set>
                                       <p:cBhvr>
-                                        <p:cTn id="12" fill="hold"/>
-                                        <p:tgtEl>
-                                          <p:spTgt spid="148"/>
+                                        <p:cTn id="17" fill="hold"/>
+                                        <p:tgtEl>
+                                          <p:spTgt spid="170"/>
                                         </p:tgtEl>
                                         <p:attrNameLst>
                                           <p:attrName>style.visibility</p:attrName>
@@ -3668,46 +6012,46 @@
                                     </p:set>
                                     <p:anim calcmode="lin" valueType="num">
                                       <p:cBhvr>
-                                        <p:cTn id="13" dur="1500" fill="hold"/>
-                                        <p:tgtEl>
-                                          <p:spTgt spid="148"/>
+                                        <p:cTn id="18" dur="1500" fill="hold"/>
+                                        <p:tgtEl>
+                                          <p:spTgt spid="170"/>
                                         </p:tgtEl>
                                         <p:attrNameLst>
-                                          <p:attrName>ppt_w</p:attrName>
+                                          <p:attrName>ppt_x</p:attrName>
                                         </p:attrNameLst>
                                       </p:cBhvr>
                                       <p:tavLst>
-                                        <p:tav tm="0" fmla="#ppt_w*sin(2.5*pi*$)">
-                                          <p:val>
-                                            <p:fltVal val="0"/>
+                                        <p:tav tm="0">
+                                          <p:val>
+                                            <p:strVal val="#ppt_x"/>
                                           </p:val>
                                         </p:tav>
                                         <p:tav tm="100000">
                                           <p:val>
-                                            <p:fltVal val="1"/>
+                                            <p:strVal val="#ppt_x"/>
                                           </p:val>
                                         </p:tav>
                                       </p:tavLst>
                                     </p:anim>
                                     <p:anim calcmode="lin" valueType="num">
                                       <p:cBhvr>
-                                        <p:cTn id="14" dur="1500" fill="hold"/>
-                                        <p:tgtEl>
-                                          <p:spTgt spid="148"/>
+                                        <p:cTn id="19" dur="1500" fill="hold"/>
+                                        <p:tgtEl>
+                                          <p:spTgt spid="170"/>
                                         </p:tgtEl>
                                         <p:attrNameLst>
-                                          <p:attrName>ppt_h</p:attrName>
+                                          <p:attrName>ppt_y</p:attrName>
                                         </p:attrNameLst>
                                       </p:cBhvr>
                                       <p:tavLst>
                                         <p:tav tm="0">
                                           <p:val>
-                                            <p:strVal val="#ppt_h"/>
+                                            <p:strVal val="0-#ppt_h/2"/>
                                           </p:val>
                                         </p:tav>
                                         <p:tav tm="100000">
                                           <p:val>
-                                            <p:strVal val="#ppt_h"/>
+                                            <p:strVal val="#ppt_y"/>
                                           </p:val>
                                         </p:tav>
                                       </p:tavLst>
@@ -3722,31 +6066,31 @@
                     </p:cTn>
                   </p:par>
                   <p:par>
-                    <p:cTn id="15" fill="hold">
+                    <p:cTn id="20" fill="hold">
                       <p:stCondLst>
                         <p:cond delay="indefinite"/>
                       </p:stCondLst>
                       <p:childTnLst>
                         <p:par>
-                          <p:cTn id="16" fill="hold">
+                          <p:cTn id="21" fill="hold">
                             <p:stCondLst>
                               <p:cond delay="0"/>
                             </p:stCondLst>
                             <p:childTnLst>
                               <p:par>
-                                <p:cTn id="17" presetClass="entr" nodeType="clickEffect" presetSubtype="0" presetID="2" grpId="3" fill="hold">
+                                <p:cTn id="22" presetClass="entr" nodeType="clickEffect" presetSubtype="1" presetID="2" grpId="4" fill="hold">
                                   <p:stCondLst>
                                     <p:cond delay="0"/>
                                   </p:stCondLst>
-                                  <p:iterate type="lt" backwards="0">
+                                  <p:iterate type="el" backwards="0">
                                     <p:tmAbs val="0"/>
                                   </p:iterate>
                                   <p:childTnLst>
                                     <p:set>
                                       <p:cBhvr>
-                                        <p:cTn id="18" fill="hold"/>
-                                        <p:tgtEl>
-                                          <p:spTgt spid="149"/>
+                                        <p:cTn id="23" fill="hold"/>
+                                        <p:tgtEl>
+                                          <p:spTgt spid="174"/>
                                         </p:tgtEl>
                                         <p:attrNameLst>
                                           <p:attrName>style.visibility</p:attrName>
@@ -3758,9 +6102,9 @@
                                     </p:set>
                                     <p:anim calcmode="lin" valueType="num">
                                       <p:cBhvr>
-                                        <p:cTn id="19" dur="1500" fill="hold"/>
-                                        <p:tgtEl>
-                                          <p:spTgt spid="149"/>
+                                        <p:cTn id="24" dur="1500" fill="hold"/>
+                                        <p:tgtEl>
+                                          <p:spTgt spid="174"/>
                                         </p:tgtEl>
                                         <p:attrNameLst>
                                           <p:attrName>ppt_x</p:attrName>
@@ -3781,9 +6125,9 @@
                                     </p:anim>
                                     <p:anim calcmode="lin" valueType="num">
                                       <p:cBhvr>
-                                        <p:cTn id="20" dur="1500" fill="hold"/>
-                                        <p:tgtEl>
-                                          <p:spTgt spid="149"/>
+                                        <p:cTn id="25" dur="1500" fill="hold"/>
+                                        <p:tgtEl>
+                                          <p:spTgt spid="174"/>
                                         </p:tgtEl>
                                         <p:attrNameLst>
                                           <p:attrName>ppt_y</p:attrName>
@@ -3812,19 +6156,19 @@
                     </p:cTn>
                   </p:par>
                   <p:par>
-                    <p:cTn id="21" fill="hold">
+                    <p:cTn id="26" fill="hold">
                       <p:stCondLst>
                         <p:cond delay="indefinite"/>
                       </p:stCondLst>
                       <p:childTnLst>
                         <p:par>
-                          <p:cTn id="22" fill="hold">
+                          <p:cTn id="27" fill="hold">
                             <p:stCondLst>
                               <p:cond delay="0"/>
                             </p:stCondLst>
                             <p:childTnLst>
                               <p:par>
-                                <p:cTn id="23" presetClass="entr" nodeType="clickEffect" presetSubtype="9" presetID="15" grpId="4" fill="hold">
+                                <p:cTn id="28" presetClass="entr" nodeType="clickEffect" presetSubtype="8" presetID="2" grpId="5" fill="hold">
                                   <p:stCondLst>
                                     <p:cond delay="0"/>
                                   </p:stCondLst>
@@ -3834,9 +6178,9 @@
                                   <p:childTnLst>
                                     <p:set>
                                       <p:cBhvr>
-                                        <p:cTn id="24" fill="hold"/>
-                                        <p:tgtEl>
-                                          <p:spTgt spid="150"/>
+                                        <p:cTn id="29" fill="hold"/>
+                                        <p:tgtEl>
+                                          <p:spTgt spid="173"/>
                                         </p:tgtEl>
                                         <p:attrNameLst>
                                           <p:attrName>style.visibility</p:attrName>
@@ -3848,92 +6192,46 @@
                                     </p:set>
                                     <p:anim calcmode="lin" valueType="num">
                                       <p:cBhvr>
-                                        <p:cTn id="25" dur="1500" fill="hold"/>
-                                        <p:tgtEl>
-                                          <p:spTgt spid="150"/>
+                                        <p:cTn id="30" dur="1500" fill="hold"/>
+                                        <p:tgtEl>
+                                          <p:spTgt spid="173"/>
                                         </p:tgtEl>
                                         <p:attrNameLst>
-                                          <p:attrName>ppt_w</p:attrName>
+                                          <p:attrName>ppt_x</p:attrName>
                                         </p:attrNameLst>
                                       </p:cBhvr>
                                       <p:tavLst>
                                         <p:tav tm="0">
                                           <p:val>
-                                            <p:fltVal val="0"/>
+                                            <p:strVal val="0-#ppt_w/2"/>
                                           </p:val>
                                         </p:tav>
                                         <p:tav tm="100000">
                                           <p:val>
-                                            <p:strVal val="#ppt_w"/>
+                                            <p:strVal val="#ppt_x"/>
                                           </p:val>
                                         </p:tav>
                                       </p:tavLst>
                                     </p:anim>
                                     <p:anim calcmode="lin" valueType="num">
                                       <p:cBhvr>
-                                        <p:cTn id="26" dur="1500" fill="hold"/>
-                                        <p:tgtEl>
-                                          <p:spTgt spid="150"/>
-                                        </p:tgtEl>
-                                        <p:attrNameLst>
-                                          <p:attrName>ppt_h</p:attrName>
-                                        </p:attrNameLst>
-                                      </p:cBhvr>
-                                      <p:tavLst>
-                                        <p:tav tm="0">
-                                          <p:val>
-                                            <p:fltVal val="0"/>
-                                          </p:val>
-                                        </p:tav>
-                                        <p:tav tm="100000">
-                                          <p:val>
-                                            <p:strVal val="#ppt_h"/>
-                                          </p:val>
-                                        </p:tav>
-                                      </p:tavLst>
-                                    </p:anim>
-                                    <p:anim calcmode="lin" valueType="num">
-                                      <p:cBhvr>
-                                        <p:cTn id="27" dur="1500" fill="hold"/>
-                                        <p:tgtEl>
-                                          <p:spTgt spid="150"/>
-                                        </p:tgtEl>
-                                        <p:attrNameLst>
-                                          <p:attrName>ppt_x</p:attrName>
-                                        </p:attrNameLst>
-                                      </p:cBhvr>
-                                      <p:tavLst>
-                                        <p:tav tm="0" fmla="#ppt_x+(cos(-2*pi*(1-$))*-#ppt_x-sin(-2*pi*(1-$))*(1-#ppt_y))*(1-$)">
-                                          <p:val>
-                                            <p:fltVal val="0"/>
-                                          </p:val>
-                                        </p:tav>
-                                        <p:tav tm="100000">
-                                          <p:val>
-                                            <p:fltVal val="1"/>
-                                          </p:val>
-                                        </p:tav>
-                                      </p:tavLst>
-                                    </p:anim>
-                                    <p:anim calcmode="lin" valueType="num">
-                                      <p:cBhvr>
-                                        <p:cTn id="28" dur="1500" fill="hold"/>
-                                        <p:tgtEl>
-                                          <p:spTgt spid="150"/>
+                                        <p:cTn id="31" dur="1500" fill="hold"/>
+                                        <p:tgtEl>
+                                          <p:spTgt spid="173"/>
                                         </p:tgtEl>
                                         <p:attrNameLst>
                                           <p:attrName>ppt_y</p:attrName>
                                         </p:attrNameLst>
                                       </p:cBhvr>
                                       <p:tavLst>
-                                        <p:tav tm="0" fmla="#ppt_y+(sin(-2*pi*(1-$))*-#ppt_x+cos(-2*pi*(1-$))*(1-#ppt_y))*(1-$)">
-                                          <p:val>
-                                            <p:fltVal val="0"/>
+                                        <p:tav tm="0">
+                                          <p:val>
+                                            <p:strVal val="#ppt_y"/>
                                           </p:val>
                                         </p:tav>
                                         <p:tav tm="100000">
                                           <p:val>
-                                            <p:fltVal val="1"/>
+                                            <p:strVal val="#ppt_y"/>
                                           </p:val>
                                         </p:tav>
                                       </p:tavLst>
@@ -3948,19 +6246,19 @@
                     </p:cTn>
                   </p:par>
                   <p:par>
-                    <p:cTn id="29" fill="hold">
+                    <p:cTn id="32" fill="hold">
                       <p:stCondLst>
                         <p:cond delay="indefinite"/>
                       </p:stCondLst>
                       <p:childTnLst>
                         <p:par>
-                          <p:cTn id="30" fill="hold">
+                          <p:cTn id="33" fill="hold">
                             <p:stCondLst>
                               <p:cond delay="0"/>
                             </p:stCondLst>
                             <p:childTnLst>
                               <p:par>
-                                <p:cTn id="31" presetClass="entr" nodeType="clickEffect" presetSubtype="8" presetID="22" grpId="5" fill="hold">
+                                <p:cTn id="34" presetClass="entr" nodeType="clickEffect" presetSubtype="9" presetID="15" grpId="6" fill="hold">
                                   <p:stCondLst>
                                     <p:cond delay="0"/>
                                   </p:stCondLst>
@@ -3970,9 +6268,145 @@
                                   <p:childTnLst>
                                     <p:set>
                                       <p:cBhvr>
-                                        <p:cTn id="32" fill="hold"/>
-                                        <p:tgtEl>
-                                          <p:spTgt spid="151"/>
+                                        <p:cTn id="35" fill="hold"/>
+                                        <p:tgtEl>
+                                          <p:spTgt spid="171"/>
+                                        </p:tgtEl>
+                                        <p:attrNameLst>
+                                          <p:attrName>style.visibility</p:attrName>
+                                        </p:attrNameLst>
+                                      </p:cBhvr>
+                                      <p:to>
+                                        <p:strVal val="visible"/>
+                                      </p:to>
+                                    </p:set>
+                                    <p:anim calcmode="lin" valueType="num">
+                                      <p:cBhvr>
+                                        <p:cTn id="36" dur="1500" fill="hold"/>
+                                        <p:tgtEl>
+                                          <p:spTgt spid="171"/>
+                                        </p:tgtEl>
+                                        <p:attrNameLst>
+                                          <p:attrName>ppt_w</p:attrName>
+                                        </p:attrNameLst>
+                                      </p:cBhvr>
+                                      <p:tavLst>
+                                        <p:tav tm="0">
+                                          <p:val>
+                                            <p:fltVal val="0"/>
+                                          </p:val>
+                                        </p:tav>
+                                        <p:tav tm="100000">
+                                          <p:val>
+                                            <p:strVal val="#ppt_w"/>
+                                          </p:val>
+                                        </p:tav>
+                                      </p:tavLst>
+                                    </p:anim>
+                                    <p:anim calcmode="lin" valueType="num">
+                                      <p:cBhvr>
+                                        <p:cTn id="37" dur="1500" fill="hold"/>
+                                        <p:tgtEl>
+                                          <p:spTgt spid="171"/>
+                                        </p:tgtEl>
+                                        <p:attrNameLst>
+                                          <p:attrName>ppt_h</p:attrName>
+                                        </p:attrNameLst>
+                                      </p:cBhvr>
+                                      <p:tavLst>
+                                        <p:tav tm="0">
+                                          <p:val>
+                                            <p:fltVal val="0"/>
+                                          </p:val>
+                                        </p:tav>
+                                        <p:tav tm="100000">
+                                          <p:val>
+                                            <p:strVal val="#ppt_h"/>
+                                          </p:val>
+                                        </p:tav>
+                                      </p:tavLst>
+                                    </p:anim>
+                                    <p:anim calcmode="lin" valueType="num">
+                                      <p:cBhvr>
+                                        <p:cTn id="38" dur="1500" fill="hold"/>
+                                        <p:tgtEl>
+                                          <p:spTgt spid="171"/>
+                                        </p:tgtEl>
+                                        <p:attrNameLst>
+                                          <p:attrName>ppt_x</p:attrName>
+                                        </p:attrNameLst>
+                                      </p:cBhvr>
+                                      <p:tavLst>
+                                        <p:tav tm="0" fmla="#ppt_x+(cos(-2*pi*(1-$))*-#ppt_x-sin(-2*pi*(1-$))*(1-#ppt_y))*(1-$)">
+                                          <p:val>
+                                            <p:fltVal val="0"/>
+                                          </p:val>
+                                        </p:tav>
+                                        <p:tav tm="100000">
+                                          <p:val>
+                                            <p:fltVal val="1"/>
+                                          </p:val>
+                                        </p:tav>
+                                      </p:tavLst>
+                                    </p:anim>
+                                    <p:anim calcmode="lin" valueType="num">
+                                      <p:cBhvr>
+                                        <p:cTn id="39" dur="1500" fill="hold"/>
+                                        <p:tgtEl>
+                                          <p:spTgt spid="171"/>
+                                        </p:tgtEl>
+                                        <p:attrNameLst>
+                                          <p:attrName>ppt_y</p:attrName>
+                                        </p:attrNameLst>
+                                      </p:cBhvr>
+                                      <p:tavLst>
+                                        <p:tav tm="0" fmla="#ppt_y+(sin(-2*pi*(1-$))*-#ppt_x+cos(-2*pi*(1-$))*(1-#ppt_y))*(1-$)">
+                                          <p:val>
+                                            <p:fltVal val="0"/>
+                                          </p:val>
+                                        </p:tav>
+                                        <p:tav tm="100000">
+                                          <p:val>
+                                            <p:fltVal val="1"/>
+                                          </p:val>
+                                        </p:tav>
+                                      </p:tavLst>
+                                    </p:anim>
+                                  </p:childTnLst>
+                                </p:cTn>
+                              </p:par>
+                            </p:childTnLst>
+                          </p:cTn>
+                        </p:par>
+                      </p:childTnLst>
+                    </p:cTn>
+                  </p:par>
+                  <p:par>
+                    <p:cTn id="40" fill="hold">
+                      <p:stCondLst>
+                        <p:cond delay="indefinite"/>
+                      </p:stCondLst>
+                      <p:childTnLst>
+                        <p:par>
+                          <p:cTn id="41" fill="hold">
+                            <p:stCondLst>
+                              <p:cond delay="0"/>
+                            </p:stCondLst>
+                            <p:childTnLst>
+                              <p:par>
+                                <p:cTn id="42" presetClass="entr" nodeType="clickEffect" presetSubtype="8" presetID="22" grpId="7" fill="hold">
+                                  <p:stCondLst>
+                                    <p:cond delay="0"/>
+                                  </p:stCondLst>
+                                  <p:iterate type="el" backwards="0">
+                                    <p:tmAbs val="0"/>
+                                  </p:iterate>
+                                  <p:childTnLst>
+                                    <p:set>
+                                      <p:cBhvr>
+                                        <p:cTn id="43" fill="hold"/>
+                                        <p:tgtEl>
+                                          <p:spTgt spid="172"/>
                                         </p:tgtEl>
                                         <p:attrNameLst>
                                           <p:attrName>style.visibility</p:attrName>
@@ -3984,9 +6418,52 @@
                                     </p:set>
                                     <p:animEffect filter="wipe(left)" transition="in">
                                       <p:cBhvr>
-                                        <p:cTn id="33" dur="1500"/>
-                                        <p:tgtEl>
-                                          <p:spTgt spid="151"/>
+                                        <p:cTn id="44" dur="1500"/>
+                                        <p:tgtEl>
+                                          <p:spTgt spid="172"/>
+                                        </p:tgtEl>
+                                      </p:cBhvr>
+                                    </p:animEffect>
+                                  </p:childTnLst>
+                                </p:cTn>
+                              </p:par>
+                            </p:childTnLst>
+                          </p:cTn>
+                        </p:par>
+                        <p:par>
+                          <p:cTn id="45" fill="hold">
+                            <p:stCondLst>
+                              <p:cond delay="1500"/>
+                            </p:stCondLst>
+                            <p:childTnLst>
+                              <p:par>
+                                <p:cTn id="46" presetClass="entr" nodeType="afterEffect" presetSubtype="4" presetID="22" grpId="8" fill="hold">
+                                  <p:stCondLst>
+                                    <p:cond delay="0"/>
+                                  </p:stCondLst>
+                                  <p:iterate type="el" backwards="0">
+                                    <p:tmAbs val="0"/>
+                                  </p:iterate>
+                                  <p:childTnLst>
+                                    <p:set>
+                                      <p:cBhvr>
+                                        <p:cTn id="47" fill="hold"/>
+                                        <p:tgtEl>
+                                          <p:spTgt spid="175"/>
+                                        </p:tgtEl>
+                                        <p:attrNameLst>
+                                          <p:attrName>style.visibility</p:attrName>
+                                        </p:attrNameLst>
+                                      </p:cBhvr>
+                                      <p:to>
+                                        <p:strVal val="visible"/>
+                                      </p:to>
+                                    </p:set>
+                                    <p:animEffect filter="wipe(down)" transition="in">
+                                      <p:cBhvr>
+                                        <p:cTn id="48" dur="4250"/>
+                                        <p:tgtEl>
+                                          <p:spTgt spid="175"/>
                                         </p:tgtEl>
                                       </p:cBhvr>
                                     </p:animEffect>
@@ -4021,11 +6498,14 @@
       </p:par>
     </p:tnLst>
     <p:bldLst>
-      <p:bldP build="whole" bldLvl="1" animBg="1" rev="0" advAuto="0" spid="147" grpId="1"/>
-      <p:bldP build="whole" bldLvl="1" animBg="1" rev="0" advAuto="0" spid="148" grpId="2"/>
-      <p:bldP build="whole" bldLvl="1" animBg="1" rev="0" advAuto="0" spid="149" grpId="3"/>
-      <p:bldP build="whole" bldLvl="1" animBg="1" rev="0" advAuto="0" spid="150" grpId="4"/>
-      <p:bldP build="whole" bldLvl="1" animBg="1" rev="0" advAuto="0" spid="151" grpId="5"/>
+      <p:bldP build="whole" bldLvl="1" animBg="1" rev="0" advAuto="0" spid="170" grpId="3"/>
+      <p:bldP build="whole" bldLvl="1" animBg="1" rev="0" advAuto="0" spid="173" grpId="5"/>
+      <p:bldP build="whole" bldLvl="1" animBg="1" rev="0" advAuto="0" spid="172" grpId="7"/>
+      <p:bldP build="whole" bldLvl="1" animBg="1" rev="0" advAuto="0" spid="169" grpId="2"/>
+      <p:bldP build="whole" bldLvl="1" animBg="1" rev="0" advAuto="0" spid="171" grpId="6"/>
+      <p:bldP build="whole" bldLvl="1" animBg="1" rev="0" advAuto="0" spid="175" grpId="8"/>
+      <p:bldP build="whole" bldLvl="1" animBg="1" rev="0" advAuto="0" spid="168" grpId="1"/>
+      <p:bldP build="whole" bldLvl="1" animBg="1" rev="0" advAuto="0" spid="174" grpId="4"/>
     </p:bldLst>
   </p:timing>
 </p:sld>
@@ -5215,7 +7695,7 @@
                             </p:stCondLst>
                             <p:childTnLst>
                               <p:par>
-                                <p:cTn id="52" presetClass="entr" nodeType="clickEffect" presetID="9" grpId="7" fill="hold">
+                                <p:cTn id="52" presetClass="entr" nodeType="clickEffect" presetSubtype="16" presetID="23" grpId="7" fill="hold">
                                   <p:stCondLst>
                                     <p:cond delay="0"/>
                                   </p:stCondLst>
@@ -5237,86 +7717,34 @@
                                         <p:strVal val="visible"/>
                                       </p:to>
                                     </p:set>
-                                    <p:animEffect filter="dissolve" transition="in">
-                                      <p:cBhvr>
-                                        <p:cTn id="54" dur="3000"/>
+                                    <p:anim calcmode="lin" valueType="num">
+                                      <p:cBhvr>
+                                        <p:cTn id="54" dur="3000" fill="hold"/>
                                         <p:tgtEl>
                                           <p:spTgt spid="120"/>
-                                        </p:tgtEl>
-                                      </p:cBhvr>
-                                    </p:animEffect>
-                                  </p:childTnLst>
-                                </p:cTn>
-                              </p:par>
-                            </p:childTnLst>
-                          </p:cTn>
-                        </p:par>
-                      </p:childTnLst>
-                    </p:cTn>
-                  </p:par>
-                  <p:par>
-                    <p:cTn id="55" fill="hold">
-                      <p:stCondLst>
-                        <p:cond delay="indefinite"/>
-                      </p:stCondLst>
-                      <p:childTnLst>
-                        <p:par>
-                          <p:cTn id="56" fill="hold">
-                            <p:stCondLst>
-                              <p:cond delay="0"/>
-                            </p:stCondLst>
-                            <p:childTnLst>
-                              <p:par>
-                                <p:cTn id="57" presetClass="entr" nodeType="clickEffect" presetSubtype="10" presetID="19" grpId="8" fill="hold">
-                                  <p:stCondLst>
-                                    <p:cond delay="0"/>
-                                  </p:stCondLst>
-                                  <p:iterate type="el" backwards="0">
-                                    <p:tmAbs val="0"/>
-                                  </p:iterate>
-                                  <p:childTnLst>
-                                    <p:set>
-                                      <p:cBhvr>
-                                        <p:cTn id="58" fill="hold"/>
-                                        <p:tgtEl>
-                                          <p:spTgt spid="122"/>
-                                        </p:tgtEl>
-                                        <p:attrNameLst>
-                                          <p:attrName>style.visibility</p:attrName>
-                                        </p:attrNameLst>
-                                      </p:cBhvr>
-                                      <p:to>
-                                        <p:strVal val="visible"/>
-                                      </p:to>
-                                    </p:set>
-                                    <p:anim calcmode="lin" valueType="num">
-                                      <p:cBhvr>
-                                        <p:cTn id="59" dur="1000" fill="hold"/>
-                                        <p:tgtEl>
-                                          <p:spTgt spid="122"/>
                                         </p:tgtEl>
                                         <p:attrNameLst>
                                           <p:attrName>ppt_w</p:attrName>
                                         </p:attrNameLst>
                                       </p:cBhvr>
                                       <p:tavLst>
-                                        <p:tav tm="0" fmla="#ppt_w*sin(2.5*pi*$)">
+                                        <p:tav tm="0">
                                           <p:val>
                                             <p:fltVal val="0"/>
                                           </p:val>
                                         </p:tav>
                                         <p:tav tm="100000">
                                           <p:val>
-                                            <p:fltVal val="1"/>
+                                            <p:strVal val="#ppt_w"/>
                                           </p:val>
                                         </p:tav>
                                       </p:tavLst>
                                     </p:anim>
                                     <p:anim calcmode="lin" valueType="num">
                                       <p:cBhvr>
-                                        <p:cTn id="60" dur="1000" fill="hold"/>
-                                        <p:tgtEl>
-                                          <p:spTgt spid="122"/>
+                                        <p:cTn id="55" dur="3000" fill="hold"/>
+                                        <p:tgtEl>
+                                          <p:spTgt spid="120"/>
                                         </p:tgtEl>
                                         <p:attrNameLst>
                                           <p:attrName>ppt_h</p:attrName>
@@ -5325,7 +7753,7 @@
                                       <p:tavLst>
                                         <p:tav tm="0">
                                           <p:val>
-                                            <p:strVal val="#ppt_h"/>
+                                            <p:fltVal val="0"/>
                                           </p:val>
                                         </p:tav>
                                         <p:tav tm="100000">
@@ -5345,19 +7773,19 @@
                     </p:cTn>
                   </p:par>
                   <p:par>
-                    <p:cTn id="61" fill="hold">
+                    <p:cTn id="56" fill="hold">
                       <p:stCondLst>
                         <p:cond delay="indefinite"/>
                       </p:stCondLst>
                       <p:childTnLst>
                         <p:par>
-                          <p:cTn id="62" fill="hold">
+                          <p:cTn id="57" fill="hold">
                             <p:stCondLst>
                               <p:cond delay="0"/>
                             </p:stCondLst>
                             <p:childTnLst>
                               <p:par>
-                                <p:cTn id="63" presetClass="entr" nodeType="clickEffect" presetSubtype="10" presetID="19" grpId="9" fill="hold">
+                                <p:cTn id="58" presetClass="entr" nodeType="clickEffect" presetSubtype="10" presetID="19" grpId="8" fill="hold">
                                   <p:stCondLst>
                                     <p:cond delay="0"/>
                                   </p:stCondLst>
@@ -5367,9 +7795,9 @@
                                   <p:childTnLst>
                                     <p:set>
                                       <p:cBhvr>
-                                        <p:cTn id="64" fill="hold"/>
-                                        <p:tgtEl>
-                                          <p:spTgt spid="121"/>
+                                        <p:cTn id="59" fill="hold"/>
+                                        <p:tgtEl>
+                                          <p:spTgt spid="122"/>
                                         </p:tgtEl>
                                         <p:attrNameLst>
                                           <p:attrName>style.visibility</p:attrName>
@@ -5381,9 +7809,9 @@
                                     </p:set>
                                     <p:anim calcmode="lin" valueType="num">
                                       <p:cBhvr>
-                                        <p:cTn id="65" dur="1000" fill="hold"/>
-                                        <p:tgtEl>
-                                          <p:spTgt spid="121"/>
+                                        <p:cTn id="60" dur="1000" fill="hold"/>
+                                        <p:tgtEl>
+                                          <p:spTgt spid="122"/>
                                         </p:tgtEl>
                                         <p:attrNameLst>
                                           <p:attrName>ppt_w</p:attrName>
@@ -5404,7 +7832,97 @@
                                     </p:anim>
                                     <p:anim calcmode="lin" valueType="num">
                                       <p:cBhvr>
+                                        <p:cTn id="61" dur="1000" fill="hold"/>
+                                        <p:tgtEl>
+                                          <p:spTgt spid="122"/>
+                                        </p:tgtEl>
+                                        <p:attrNameLst>
+                                          <p:attrName>ppt_h</p:attrName>
+                                        </p:attrNameLst>
+                                      </p:cBhvr>
+                                      <p:tavLst>
+                                        <p:tav tm="0">
+                                          <p:val>
+                                            <p:strVal val="#ppt_h"/>
+                                          </p:val>
+                                        </p:tav>
+                                        <p:tav tm="100000">
+                                          <p:val>
+                                            <p:strVal val="#ppt_h"/>
+                                          </p:val>
+                                        </p:tav>
+                                      </p:tavLst>
+                                    </p:anim>
+                                  </p:childTnLst>
+                                </p:cTn>
+                              </p:par>
+                            </p:childTnLst>
+                          </p:cTn>
+                        </p:par>
+                      </p:childTnLst>
+                    </p:cTn>
+                  </p:par>
+                  <p:par>
+                    <p:cTn id="62" fill="hold">
+                      <p:stCondLst>
+                        <p:cond delay="indefinite"/>
+                      </p:stCondLst>
+                      <p:childTnLst>
+                        <p:par>
+                          <p:cTn id="63" fill="hold">
+                            <p:stCondLst>
+                              <p:cond delay="0"/>
+                            </p:stCondLst>
+                            <p:childTnLst>
+                              <p:par>
+                                <p:cTn id="64" presetClass="entr" nodeType="clickEffect" presetSubtype="10" presetID="19" grpId="9" fill="hold">
+                                  <p:stCondLst>
+                                    <p:cond delay="0"/>
+                                  </p:stCondLst>
+                                  <p:iterate type="el" backwards="0">
+                                    <p:tmAbs val="0"/>
+                                  </p:iterate>
+                                  <p:childTnLst>
+                                    <p:set>
+                                      <p:cBhvr>
+                                        <p:cTn id="65" fill="hold"/>
+                                        <p:tgtEl>
+                                          <p:spTgt spid="121"/>
+                                        </p:tgtEl>
+                                        <p:attrNameLst>
+                                          <p:attrName>style.visibility</p:attrName>
+                                        </p:attrNameLst>
+                                      </p:cBhvr>
+                                      <p:to>
+                                        <p:strVal val="visible"/>
+                                      </p:to>
+                                    </p:set>
+                                    <p:anim calcmode="lin" valueType="num">
+                                      <p:cBhvr>
                                         <p:cTn id="66" dur="1000" fill="hold"/>
+                                        <p:tgtEl>
+                                          <p:spTgt spid="121"/>
+                                        </p:tgtEl>
+                                        <p:attrNameLst>
+                                          <p:attrName>ppt_w</p:attrName>
+                                        </p:attrNameLst>
+                                      </p:cBhvr>
+                                      <p:tavLst>
+                                        <p:tav tm="0" fmla="#ppt_w*sin(2.5*pi*$)">
+                                          <p:val>
+                                            <p:fltVal val="0"/>
+                                          </p:val>
+                                        </p:tav>
+                                        <p:tav tm="100000">
+                                          <p:val>
+                                            <p:fltVal val="1"/>
+                                          </p:val>
+                                        </p:tav>
+                                      </p:tavLst>
+                                    </p:anim>
+                                    <p:anim calcmode="lin" valueType="num">
+                                      <p:cBhvr>
+                                        <p:cTn id="67" dur="1000" fill="hold"/>
                                         <p:tgtEl>
                                           <p:spTgt spid="121"/>
                                         </p:tgtEl>
@@ -5456,15 +7974,15 @@
       </p:par>
     </p:tnLst>
     <p:bldLst>
-      <p:bldP build="whole" bldLvl="1" animBg="1" rev="0" advAuto="0" spid="120" grpId="7"/>
-      <p:bldP build="whole" bldLvl="1" animBg="1" rev="0" advAuto="0" spid="115" grpId="2"/>
+      <p:bldP build="p" bldLvl="5" animBg="1" rev="0" advAuto="0" spid="119" grpId="6"/>
+      <p:bldP build="whole" bldLvl="1" animBg="1" rev="0" advAuto="0" spid="122" grpId="8"/>
       <p:bldP build="whole" bldLvl="1" animBg="1" rev="0" advAuto="0" spid="121" grpId="9"/>
-      <p:bldP build="p" bldLvl="5" animBg="1" rev="0" advAuto="0" spid="118" grpId="5"/>
-      <p:bldP build="whole" bldLvl="1" animBg="1" rev="0" advAuto="0" spid="122" grpId="8"/>
+      <p:bldP build="whole" bldLvl="1" animBg="1" rev="0" advAuto="0" spid="114" grpId="1"/>
       <p:bldP build="p" bldLvl="5" animBg="1" rev="0" advAuto="0" spid="116" grpId="3"/>
       <p:bldP build="p" bldLvl="5" animBg="1" rev="0" advAuto="0" spid="117" grpId="4"/>
-      <p:bldP build="p" bldLvl="5" animBg="1" rev="0" advAuto="0" spid="119" grpId="6"/>
-      <p:bldP build="whole" bldLvl="1" animBg="1" rev="0" advAuto="0" spid="114" grpId="1"/>
+      <p:bldP build="p" bldLvl="5" animBg="1" rev="0" advAuto="0" spid="118" grpId="5"/>
+      <p:bldP build="whole" bldLvl="1" animBg="1" rev="0" advAuto="0" spid="115" grpId="2"/>
+      <p:bldP build="whole" bldLvl="1" animBg="1" rev="0" advAuto="0" spid="120" grpId="7"/>
     </p:bldLst>
   </p:timing>
 </p:sld>
@@ -5547,8 +8065,8 @@
         </p:nvSpPr>
         <p:spPr>
           <a:xfrm>
-            <a:off x="311699" y="1152475"/>
-            <a:ext cx="8610601" cy="622301"/>
+            <a:off x="311699" y="1139774"/>
+            <a:ext cx="7917509" cy="622301"/>
           </a:xfrm>
           <a:prstGeom prst="rect">
             <a:avLst/>
@@ -5557,15 +8075,15 @@
         <p:txBody>
           <a:bodyPr/>
           <a:lstStyle>
-            <a:lvl1pPr marL="406908" indent="-305180" defTabSz="813816">
+            <a:lvl1pPr marL="429768" indent="-322325" defTabSz="859536">
               <a:buSzPts val="1600"/>
-              <a:defRPr sz="1602"/>
+              <a:defRPr sz="1692"/>
             </a:lvl1pPr>
           </a:lstStyle>
           <a:p>
             <a:pPr/>
             <a:r>
-              <a:t>Data collecting via Google Sheet with "Yhfinance" add-on, Pytrends API, and Alpaca API</a:t>
+              <a:t>Data collecting via Google Sheet with "Yhfinance" add-on, and Pytrends API</a:t>
             </a:r>
           </a:p>
         </p:txBody>
@@ -5668,11 +8186,11 @@
                             </p:stCondLst>
                             <p:childTnLst>
                               <p:par>
-                                <p:cTn id="5" presetClass="entr" nodeType="afterEffect" presetSubtype="16" presetID="23" grpId="1" fill="hold">
+                                <p:cTn id="5" presetClass="entr" nodeType="afterEffect" presetSubtype="8" presetID="2" grpId="1" fill="hold">
                                   <p:stCondLst>
                                     <p:cond delay="0"/>
                                   </p:stCondLst>
-                                  <p:iterate type="el" backwards="0">
+                                  <p:iterate type="lt" backwards="0">
                                     <p:tmAbs val="0"/>
                                   </p:iterate>
                                   <p:childTnLst>
@@ -5697,18 +8215,18 @@
                                           <p:spTgt spid="124"/>
                                         </p:tgtEl>
                                         <p:attrNameLst>
-                                          <p:attrName>ppt_w</p:attrName>
+                                          <p:attrName>ppt_x</p:attrName>
                                         </p:attrNameLst>
                                       </p:cBhvr>
                                       <p:tavLst>
                                         <p:tav tm="0">
                                           <p:val>
-                                            <p:fltVal val="0"/>
+                                            <p:strVal val="0-#ppt_w/2"/>
                                           </p:val>
                                         </p:tav>
                                         <p:tav tm="100000">
                                           <p:val>
-                                            <p:strVal val="#ppt_w"/>
+                                            <p:strVal val="#ppt_x"/>
                                           </p:val>
                                         </p:tav>
                                       </p:tavLst>
@@ -5720,18 +8238,18 @@
                                           <p:spTgt spid="124"/>
                                         </p:tgtEl>
                                         <p:attrNameLst>
-                                          <p:attrName>ppt_h</p:attrName>
+                                          <p:attrName>ppt_y</p:attrName>
                                         </p:attrNameLst>
                                       </p:cBhvr>
                                       <p:tavLst>
                                         <p:tav tm="0">
                                           <p:val>
-                                            <p:fltVal val="0"/>
+                                            <p:strVal val="#ppt_y"/>
                                           </p:val>
                                         </p:tav>
                                         <p:tav tm="100000">
                                           <p:val>
-                                            <p:strVal val="#ppt_h"/>
+                                            <p:strVal val="#ppt_y"/>
                                           </p:val>
                                         </p:tav>
                                       </p:tavLst>
@@ -5909,9 +8427,9 @@
       </p:par>
     </p:tnLst>
     <p:bldLst>
+      <p:bldP build="whole" bldLvl="1" animBg="1" rev="0" advAuto="0" spid="125" grpId="2"/>
+      <p:bldP build="whole" bldLvl="1" animBg="1" rev="0" advAuto="0" spid="124" grpId="1"/>
       <p:bldP build="whole" bldLvl="1" animBg="1" rev="0" advAuto="0" spid="126" grpId="3"/>
-      <p:bldP build="whole" bldLvl="1" animBg="1" rev="0" advAuto="0" spid="124" grpId="1"/>
-      <p:bldP build="whole" bldLvl="1" animBg="1" rev="0" advAuto="0" spid="125" grpId="2"/>
     </p:bldLst>
   </p:timing>
 </p:sld>
@@ -6715,8 +9233,8 @@
       </p:par>
     </p:tnLst>
     <p:bldLst>
+      <p:bldP build="whole" bldLvl="1" animBg="1" rev="0" advAuto="0" spid="133" grpId="2"/>
       <p:bldP build="p" bldLvl="5" animBg="1" rev="0" advAuto="0" spid="132" grpId="1"/>
-      <p:bldP build="whole" bldLvl="1" animBg="1" rev="0" advAuto="0" spid="133" grpId="2"/>
     </p:bldLst>
   </p:timing>
 </p:sld>
@@ -7074,7 +9592,7 @@
               <a:srgbClr val="FEDF98"/>
             </a:gs>
           </a:gsLst>
-          <a:lin ang="16200000" scaled="0"/>
+          <a:lin ang="0" scaled="0"/>
         </a:gradFill>
       </p:bgPr>
     </p:bg>
@@ -7092,16 +9610,45 @@
           <a:chExt cx="0" cy="0"/>
         </a:xfrm>
       </p:grpSpPr>
+      <p:pic>
+        <p:nvPicPr>
+          <p:cNvPr id="138" name="BTC_and_OIL.png" descr="BTC_and_OIL.png"/>
+          <p:cNvPicPr>
+            <a:picLocks noChangeAspect="1"/>
+          </p:cNvPicPr>
+          <p:nvPr/>
+        </p:nvPicPr>
+        <p:blipFill>
+          <a:blip r:embed="rId2">
+            <a:extLst/>
+          </a:blip>
+          <a:stretch>
+            <a:fillRect/>
+          </a:stretch>
+        </p:blipFill>
+        <p:spPr>
+          <a:xfrm>
+            <a:off x="455175" y="995359"/>
+            <a:ext cx="8233650" cy="3804283"/>
+          </a:xfrm>
+          <a:prstGeom prst="rect">
+            <a:avLst/>
+          </a:prstGeom>
+          <a:ln w="12700">
+            <a:miter lim="400000"/>
+          </a:ln>
+        </p:spPr>
+      </p:pic>
       <p:sp>
         <p:nvSpPr>
-          <p:cNvPr id="138" name="Narrowed Timeframe"/>
+          <p:cNvPr id="139" name="Narrowed Timeframe for Oil"/>
           <p:cNvSpPr txBox="1"/>
           <p:nvPr/>
         </p:nvSpPr>
         <p:spPr>
           <a:xfrm>
-            <a:off x="2413000" y="406400"/>
-            <a:ext cx="4318000" cy="546100"/>
+            <a:off x="2078880" y="317500"/>
+            <a:ext cx="4986240" cy="546100"/>
           </a:xfrm>
           <a:prstGeom prst="rect">
             <a:avLst/>
@@ -7144,47 +9691,11 @@
           <a:p>
             <a:pPr/>
             <a:r>
-              <a:t>Narrowed Timeframe</a:t>
+              <a:t>Narrowed Timeframe for Oil</a:t>
             </a:r>
           </a:p>
         </p:txBody>
       </p:sp>
-      <p:pic>
-        <p:nvPicPr>
-          <p:cNvPr id="139" name="Combine_Past_year.png" descr="Combine_Past_year.png"/>
-          <p:cNvPicPr>
-            <a:picLocks noChangeAspect="1"/>
-          </p:cNvPicPr>
-          <p:nvPr/>
-        </p:nvPicPr>
-        <p:blipFill>
-          <a:blip r:embed="rId2">
-            <a:extLst/>
-          </a:blip>
-          <a:stretch>
-            <a:fillRect/>
-          </a:stretch>
-        </p:blipFill>
-        <p:spPr>
-          <a:xfrm>
-            <a:off x="977900" y="1174750"/>
-            <a:ext cx="7353300" cy="3676650"/>
-          </a:xfrm>
-          <a:prstGeom prst="rect">
-            <a:avLst/>
-          </a:prstGeom>
-          <a:ln w="12700">
-            <a:miter lim="400000"/>
-          </a:ln>
-          <a:effectLst>
-            <a:outerShdw sx="100000" sy="100000" kx="0" ky="0" algn="b" rotWithShape="0" blurRad="254000" dist="127000" dir="16200000">
-              <a:srgbClr val="000000">
-                <a:alpha val="70000"/>
-              </a:srgbClr>
-            </a:outerShdw>
-          </a:effectLst>
-        </p:spPr>
-      </p:pic>
     </p:spTree>
   </p:cSld>
   <p:clrMapOvr>
@@ -7226,6 +9737,565 @@
                             </p:stCondLst>
                             <p:childTnLst>
                               <p:par>
+                                <p:cTn id="5" presetClass="entr" nodeType="afterEffect" presetSubtype="9" presetID="15" grpId="1" fill="hold">
+                                  <p:stCondLst>
+                                    <p:cond delay="0"/>
+                                  </p:stCondLst>
+                                  <p:iterate type="el" backwards="0">
+                                    <p:tmAbs val="0"/>
+                                  </p:iterate>
+                                  <p:childTnLst>
+                                    <p:set>
+                                      <p:cBhvr>
+                                        <p:cTn id="6" fill="hold"/>
+                                        <p:tgtEl>
+                                          <p:spTgt spid="139">
+                                            <p:bg/>
+                                          </p:spTgt>
+                                        </p:tgtEl>
+                                        <p:attrNameLst>
+                                          <p:attrName>style.visibility</p:attrName>
+                                        </p:attrNameLst>
+                                      </p:cBhvr>
+                                      <p:to>
+                                        <p:strVal val="visible"/>
+                                      </p:to>
+                                    </p:set>
+                                    <p:anim calcmode="lin" valueType="num">
+                                      <p:cBhvr>
+                                        <p:cTn id="7" dur="1500" fill="hold"/>
+                                        <p:tgtEl>
+                                          <p:spTgt spid="139">
+                                            <p:bg/>
+                                          </p:spTgt>
+                                        </p:tgtEl>
+                                        <p:attrNameLst>
+                                          <p:attrName>ppt_w</p:attrName>
+                                        </p:attrNameLst>
+                                      </p:cBhvr>
+                                      <p:tavLst>
+                                        <p:tav tm="0">
+                                          <p:val>
+                                            <p:fltVal val="0"/>
+                                          </p:val>
+                                        </p:tav>
+                                        <p:tav tm="100000">
+                                          <p:val>
+                                            <p:strVal val="#ppt_w"/>
+                                          </p:val>
+                                        </p:tav>
+                                      </p:tavLst>
+                                    </p:anim>
+                                    <p:anim calcmode="lin" valueType="num">
+                                      <p:cBhvr>
+                                        <p:cTn id="8" dur="1500" fill="hold"/>
+                                        <p:tgtEl>
+                                          <p:spTgt spid="139">
+                                            <p:bg/>
+                                          </p:spTgt>
+                                        </p:tgtEl>
+                                        <p:attrNameLst>
+                                          <p:attrName>ppt_h</p:attrName>
+                                        </p:attrNameLst>
+                                      </p:cBhvr>
+                                      <p:tavLst>
+                                        <p:tav tm="0">
+                                          <p:val>
+                                            <p:fltVal val="0"/>
+                                          </p:val>
+                                        </p:tav>
+                                        <p:tav tm="100000">
+                                          <p:val>
+                                            <p:strVal val="#ppt_h"/>
+                                          </p:val>
+                                        </p:tav>
+                                      </p:tavLst>
+                                    </p:anim>
+                                    <p:anim calcmode="lin" valueType="num">
+                                      <p:cBhvr>
+                                        <p:cTn id="9" dur="1500" fill="hold"/>
+                                        <p:tgtEl>
+                                          <p:spTgt spid="139">
+                                            <p:bg/>
+                                          </p:spTgt>
+                                        </p:tgtEl>
+                                        <p:attrNameLst>
+                                          <p:attrName>ppt_x</p:attrName>
+                                        </p:attrNameLst>
+                                      </p:cBhvr>
+                                      <p:tavLst>
+                                        <p:tav tm="0" fmla="#ppt_x+(cos(-2*pi*(1-$))*-#ppt_x-sin(-2*pi*(1-$))*(1-#ppt_y))*(1-$)">
+                                          <p:val>
+                                            <p:fltVal val="0"/>
+                                          </p:val>
+                                        </p:tav>
+                                        <p:tav tm="100000">
+                                          <p:val>
+                                            <p:fltVal val="1"/>
+                                          </p:val>
+                                        </p:tav>
+                                      </p:tavLst>
+                                    </p:anim>
+                                    <p:anim calcmode="lin" valueType="num">
+                                      <p:cBhvr>
+                                        <p:cTn id="10" dur="1500" fill="hold"/>
+                                        <p:tgtEl>
+                                          <p:spTgt spid="139">
+                                            <p:bg/>
+                                          </p:spTgt>
+                                        </p:tgtEl>
+                                        <p:attrNameLst>
+                                          <p:attrName>ppt_y</p:attrName>
+                                        </p:attrNameLst>
+                                      </p:cBhvr>
+                                      <p:tavLst>
+                                        <p:tav tm="0" fmla="#ppt_y+(sin(-2*pi*(1-$))*-#ppt_x+cos(-2*pi*(1-$))*(1-#ppt_y))*(1-$)">
+                                          <p:val>
+                                            <p:fltVal val="0"/>
+                                          </p:val>
+                                        </p:tav>
+                                        <p:tav tm="100000">
+                                          <p:val>
+                                            <p:fltVal val="1"/>
+                                          </p:val>
+                                        </p:tav>
+                                      </p:tavLst>
+                                    </p:anim>
+                                  </p:childTnLst>
+                                </p:cTn>
+                              </p:par>
+                              <p:par>
+                                <p:cTn id="11" presetClass="entr" nodeType="withEffect" presetSubtype="9" presetID="15" grpId="1" fill="hold">
+                                  <p:stCondLst>
+                                    <p:cond delay="0"/>
+                                  </p:stCondLst>
+                                  <p:iterate type="el" backwards="0">
+                                    <p:tmAbs val="0"/>
+                                  </p:iterate>
+                                  <p:childTnLst>
+                                    <p:set>
+                                      <p:cBhvr>
+                                        <p:cTn id="12" fill="hold"/>
+                                        <p:tgtEl>
+                                          <p:spTgt spid="139">
+                                            <p:txEl>
+                                              <p:pRg st="0" end="0"/>
+                                            </p:txEl>
+                                          </p:spTgt>
+                                        </p:tgtEl>
+                                        <p:attrNameLst>
+                                          <p:attrName>style.visibility</p:attrName>
+                                        </p:attrNameLst>
+                                      </p:cBhvr>
+                                      <p:to>
+                                        <p:strVal val="visible"/>
+                                      </p:to>
+                                    </p:set>
+                                    <p:anim calcmode="lin" valueType="num">
+                                      <p:cBhvr>
+                                        <p:cTn id="13" dur="1500" fill="hold"/>
+                                        <p:tgtEl>
+                                          <p:spTgt spid="139">
+                                            <p:txEl>
+                                              <p:pRg st="0" end="0"/>
+                                            </p:txEl>
+                                          </p:spTgt>
+                                        </p:tgtEl>
+                                        <p:attrNameLst>
+                                          <p:attrName>ppt_w</p:attrName>
+                                        </p:attrNameLst>
+                                      </p:cBhvr>
+                                      <p:tavLst>
+                                        <p:tav tm="0">
+                                          <p:val>
+                                            <p:fltVal val="0"/>
+                                          </p:val>
+                                        </p:tav>
+                                        <p:tav tm="100000">
+                                          <p:val>
+                                            <p:strVal val="#ppt_w"/>
+                                          </p:val>
+                                        </p:tav>
+                                      </p:tavLst>
+                                    </p:anim>
+                                    <p:anim calcmode="lin" valueType="num">
+                                      <p:cBhvr>
+                                        <p:cTn id="14" dur="1500" fill="hold"/>
+                                        <p:tgtEl>
+                                          <p:spTgt spid="139">
+                                            <p:txEl>
+                                              <p:pRg st="0" end="0"/>
+                                            </p:txEl>
+                                          </p:spTgt>
+                                        </p:tgtEl>
+                                        <p:attrNameLst>
+                                          <p:attrName>ppt_h</p:attrName>
+                                        </p:attrNameLst>
+                                      </p:cBhvr>
+                                      <p:tavLst>
+                                        <p:tav tm="0">
+                                          <p:val>
+                                            <p:fltVal val="0"/>
+                                          </p:val>
+                                        </p:tav>
+                                        <p:tav tm="100000">
+                                          <p:val>
+                                            <p:strVal val="#ppt_h"/>
+                                          </p:val>
+                                        </p:tav>
+                                      </p:tavLst>
+                                    </p:anim>
+                                    <p:anim calcmode="lin" valueType="num">
+                                      <p:cBhvr>
+                                        <p:cTn id="15" dur="1500" fill="hold"/>
+                                        <p:tgtEl>
+                                          <p:spTgt spid="139">
+                                            <p:txEl>
+                                              <p:pRg st="0" end="0"/>
+                                            </p:txEl>
+                                          </p:spTgt>
+                                        </p:tgtEl>
+                                        <p:attrNameLst>
+                                          <p:attrName>ppt_x</p:attrName>
+                                        </p:attrNameLst>
+                                      </p:cBhvr>
+                                      <p:tavLst>
+                                        <p:tav tm="0" fmla="#ppt_x+(cos(-2*pi*(1-$))*-#ppt_x-sin(-2*pi*(1-$))*(1-#ppt_y))*(1-$)">
+                                          <p:val>
+                                            <p:fltVal val="0"/>
+                                          </p:val>
+                                        </p:tav>
+                                        <p:tav tm="100000">
+                                          <p:val>
+                                            <p:fltVal val="1"/>
+                                          </p:val>
+                                        </p:tav>
+                                      </p:tavLst>
+                                    </p:anim>
+                                    <p:anim calcmode="lin" valueType="num">
+                                      <p:cBhvr>
+                                        <p:cTn id="16" dur="1500" fill="hold"/>
+                                        <p:tgtEl>
+                                          <p:spTgt spid="139">
+                                            <p:txEl>
+                                              <p:pRg st="0" end="0"/>
+                                            </p:txEl>
+                                          </p:spTgt>
+                                        </p:tgtEl>
+                                        <p:attrNameLst>
+                                          <p:attrName>ppt_y</p:attrName>
+                                        </p:attrNameLst>
+                                      </p:cBhvr>
+                                      <p:tavLst>
+                                        <p:tav tm="0" fmla="#ppt_y+(sin(-2*pi*(1-$))*-#ppt_x+cos(-2*pi*(1-$))*(1-#ppt_y))*(1-$)">
+                                          <p:val>
+                                            <p:fltVal val="0"/>
+                                          </p:val>
+                                        </p:tav>
+                                        <p:tav tm="100000">
+                                          <p:val>
+                                            <p:fltVal val="1"/>
+                                          </p:val>
+                                        </p:tav>
+                                      </p:tavLst>
+                                    </p:anim>
+                                  </p:childTnLst>
+                                </p:cTn>
+                              </p:par>
+                            </p:childTnLst>
+                          </p:cTn>
+                        </p:par>
+                      </p:childTnLst>
+                    </p:cTn>
+                  </p:par>
+                  <p:par>
+                    <p:cTn id="17" fill="hold">
+                      <p:stCondLst>
+                        <p:cond delay="indefinite"/>
+                      </p:stCondLst>
+                      <p:childTnLst>
+                        <p:par>
+                          <p:cTn id="18" fill="hold">
+                            <p:stCondLst>
+                              <p:cond delay="0"/>
+                            </p:stCondLst>
+                            <p:childTnLst>
+                              <p:par>
+                                <p:cTn id="19" presetClass="entr" nodeType="clickEffect" presetSubtype="32" presetID="23" grpId="2" fill="hold">
+                                  <p:stCondLst>
+                                    <p:cond delay="0"/>
+                                  </p:stCondLst>
+                                  <p:iterate type="el" backwards="0">
+                                    <p:tmAbs val="0"/>
+                                  </p:iterate>
+                                  <p:childTnLst>
+                                    <p:set>
+                                      <p:cBhvr>
+                                        <p:cTn id="20" fill="hold"/>
+                                        <p:tgtEl>
+                                          <p:spTgt spid="138"/>
+                                        </p:tgtEl>
+                                        <p:attrNameLst>
+                                          <p:attrName>style.visibility</p:attrName>
+                                        </p:attrNameLst>
+                                      </p:cBhvr>
+                                      <p:to>
+                                        <p:strVal val="visible"/>
+                                      </p:to>
+                                    </p:set>
+                                    <p:anim calcmode="lin" valueType="num">
+                                      <p:cBhvr>
+                                        <p:cTn id="21" dur="1000" fill="hold"/>
+                                        <p:tgtEl>
+                                          <p:spTgt spid="138"/>
+                                        </p:tgtEl>
+                                        <p:attrNameLst>
+                                          <p:attrName>ppt_w</p:attrName>
+                                        </p:attrNameLst>
+                                      </p:cBhvr>
+                                      <p:tavLst>
+                                        <p:tav tm="0">
+                                          <p:val>
+                                            <p:strVal val="4*#ppt_w"/>
+                                          </p:val>
+                                        </p:tav>
+                                        <p:tav tm="100000">
+                                          <p:val>
+                                            <p:strVal val="#ppt_w"/>
+                                          </p:val>
+                                        </p:tav>
+                                      </p:tavLst>
+                                    </p:anim>
+                                    <p:anim calcmode="lin" valueType="num">
+                                      <p:cBhvr>
+                                        <p:cTn id="22" dur="1000" fill="hold"/>
+                                        <p:tgtEl>
+                                          <p:spTgt spid="138"/>
+                                        </p:tgtEl>
+                                        <p:attrNameLst>
+                                          <p:attrName>ppt_h</p:attrName>
+                                        </p:attrNameLst>
+                                      </p:cBhvr>
+                                      <p:tavLst>
+                                        <p:tav tm="0">
+                                          <p:val>
+                                            <p:strVal val="4*#ppt_h"/>
+                                          </p:val>
+                                        </p:tav>
+                                        <p:tav tm="100000">
+                                          <p:val>
+                                            <p:strVal val="#ppt_h"/>
+                                          </p:val>
+                                        </p:tav>
+                                      </p:tavLst>
+                                    </p:anim>
+                                  </p:childTnLst>
+                                </p:cTn>
+                              </p:par>
+                            </p:childTnLst>
+                          </p:cTn>
+                        </p:par>
+                      </p:childTnLst>
+                    </p:cTn>
+                  </p:par>
+                </p:childTnLst>
+              </p:cTn>
+              <p:prevCondLst>
+                <p:cond evt="onPrev">
+                  <p:tgtEl>
+                    <p:sldTgt/>
+                  </p:tgtEl>
+                </p:cond>
+              </p:prevCondLst>
+              <p:nextCondLst>
+                <p:cond evt="onNext">
+                  <p:tgtEl>
+                    <p:sldTgt/>
+                  </p:tgtEl>
+                </p:cond>
+              </p:nextCondLst>
+            </p:seq>
+          </p:childTnLst>
+        </p:cTn>
+      </p:par>
+    </p:tnLst>
+    <p:bldLst>
+      <p:bldP build="p" bldLvl="5" animBg="1" rev="0" advAuto="0" spid="139" grpId="1"/>
+      <p:bldP build="whole" bldLvl="1" animBg="1" rev="0" advAuto="0" spid="138" grpId="2"/>
+    </p:bldLst>
+  </p:timing>
+</p:sld>
+</file>
+
+<file path=ppt/slides/slide8.xml><?xml version="1.0" encoding="utf-8"?>
+<p:sld xmlns:a="http://schemas.openxmlformats.org/drawingml/2006/main" xmlns:r="http://schemas.openxmlformats.org/officeDocument/2006/relationships" xmlns:p="http://schemas.openxmlformats.org/presentationml/2006/main" xmlns:m="http://schemas.openxmlformats.org/officeDocument/2006/math" xmlns:a14="http://schemas.microsoft.com/office/drawing/2010/main" showMasterSp="1" showMasterPhAnim="1">
+  <p:cSld>
+    <p:bg>
+      <p:bgPr>
+        <a:gradFill flip="none" rotWithShape="1">
+          <a:gsLst>
+            <a:gs pos="0">
+              <a:srgbClr val="FCBD00"/>
+            </a:gs>
+            <a:gs pos="35000">
+              <a:srgbClr val="FFE4D1"/>
+            </a:gs>
+            <a:gs pos="100000">
+              <a:srgbClr val="FEDF98"/>
+            </a:gs>
+          </a:gsLst>
+          <a:lin ang="16200000" scaled="0"/>
+        </a:gradFill>
+      </p:bgPr>
+    </p:bg>
+    <p:spTree>
+      <p:nvGrpSpPr>
+        <p:cNvPr id="1" name=""/>
+        <p:cNvGrpSpPr/>
+        <p:nvPr/>
+      </p:nvGrpSpPr>
+      <p:grpSpPr>
+        <a:xfrm>
+          <a:off x="0" y="0"/>
+          <a:ext cx="0" cy="0"/>
+          <a:chOff x="0" y="0"/>
+          <a:chExt cx="0" cy="0"/>
+        </a:xfrm>
+      </p:grpSpPr>
+      <p:sp>
+        <p:nvSpPr>
+          <p:cNvPr id="141" name="Narrowed Timeframe For Tech Stock"/>
+          <p:cNvSpPr txBox="1"/>
+          <p:nvPr/>
+        </p:nvSpPr>
+        <p:spPr>
+          <a:xfrm>
+            <a:off x="1686942" y="406400"/>
+            <a:ext cx="5770116" cy="546100"/>
+          </a:xfrm>
+          <a:prstGeom prst="rect">
+            <a:avLst/>
+          </a:prstGeom>
+          <a:ln w="12700">
+            <a:miter lim="400000"/>
+          </a:ln>
+          <a:extLst>
+            <a:ext uri="{C572A759-6A51-4108-AA02-DFA0A04FC94B}">
+              <ma14:wrappingTextBoxFlag xmlns:ma14="http://schemas.microsoft.com/office/mac/drawingml/2011/main" val="1"/>
+            </a:ext>
+          </a:extLst>
+        </p:spPr>
+        <p:txBody>
+          <a:bodyPr lIns="91424" tIns="91424" rIns="91424" bIns="91424">
+            <a:normAutofit fontScale="100000" lnSpcReduction="0"/>
+          </a:bodyPr>
+          <a:lstStyle>
+            <a:lvl1pPr marL="559498" indent="-457771" defTabSz="813816">
+              <a:lnSpc>
+                <a:spcPct val="110000"/>
+              </a:lnSpc>
+              <a:buClr>
+                <a:schemeClr val="accent2">
+                  <a:lumOff val="21764"/>
+                </a:schemeClr>
+              </a:buClr>
+              <a:buSzPts val="2400"/>
+              <a:buFont typeface="Arial"/>
+              <a:buChar char="●"/>
+              <a:defRPr sz="2403">
+                <a:solidFill>
+                  <a:schemeClr val="accent2">
+                    <a:lumOff val="21764"/>
+                  </a:schemeClr>
+                </a:solidFill>
+              </a:defRPr>
+            </a:lvl1pPr>
+          </a:lstStyle>
+          <a:p>
+            <a:pPr/>
+            <a:r>
+              <a:t>Narrowed Timeframe For Tech Stock </a:t>
+            </a:r>
+          </a:p>
+        </p:txBody>
+      </p:sp>
+      <p:pic>
+        <p:nvPicPr>
+          <p:cNvPr id="142" name="Combine_Past_year.png" descr="Combine_Past_year.png"/>
+          <p:cNvPicPr>
+            <a:picLocks noChangeAspect="1"/>
+          </p:cNvPicPr>
+          <p:nvPr/>
+        </p:nvPicPr>
+        <p:blipFill>
+          <a:blip r:embed="rId2">
+            <a:extLst/>
+          </a:blip>
+          <a:stretch>
+            <a:fillRect/>
+          </a:stretch>
+        </p:blipFill>
+        <p:spPr>
+          <a:xfrm>
+            <a:off x="977900" y="1174750"/>
+            <a:ext cx="7353300" cy="3676650"/>
+          </a:xfrm>
+          <a:prstGeom prst="rect">
+            <a:avLst/>
+          </a:prstGeom>
+          <a:ln w="12700">
+            <a:miter lim="400000"/>
+          </a:ln>
+          <a:effectLst>
+            <a:outerShdw sx="100000" sy="100000" kx="0" ky="0" algn="b" rotWithShape="0" blurRad="254000" dist="127000" dir="16200000">
+              <a:srgbClr val="000000">
+                <a:alpha val="70000"/>
+              </a:srgbClr>
+            </a:outerShdw>
+          </a:effectLst>
+        </p:spPr>
+      </p:pic>
+    </p:spTree>
+  </p:cSld>
+  <p:clrMapOvr>
+    <a:masterClrMapping/>
+  </p:clrMapOvr>
+  <mc:AlternateContent xmlns:mc="http://schemas.openxmlformats.org/markup-compatibility/2006">
+    <mc:Choice xmlns:p14="http://schemas.microsoft.com/office/powerpoint/2010/main" Requires="p14">
+      <p:transition spd="med" advClick="1" p14:dur="1000">
+        <p14:ripple/>
+      </p:transition>
+    </mc:Choice>
+    <mc:Fallback>
+      <p:transition spd="med">
+        <p:fade/>
+      </p:transition>
+    </mc:Fallback>
+  </mc:AlternateContent>
+  <p:timing>
+    <p:tnLst>
+      <p:par>
+        <p:cTn id="1" nodeType="tmRoot" restart="never" dur="indefinite" fill="hold">
+          <p:childTnLst>
+            <p:seq concurrent="1" prevAc="none" nextAc="seek">
+              <p:cTn id="2" nodeType="mainSeq" dur="indefinite" fill="hold">
+                <p:childTnLst>
+                  <p:par>
+                    <p:cTn id="3" fill="hold">
+                      <p:stCondLst>
+                        <p:cond delay="indefinite"/>
+                        <p:cond evt="onBegin">
+                          <p:tn val="2"/>
+                        </p:cond>
+                      </p:stCondLst>
+                      <p:childTnLst>
+                        <p:par>
+                          <p:cTn id="4" fill="hold">
+                            <p:stCondLst>
+                              <p:cond delay="0"/>
+                            </p:stCondLst>
+                            <p:childTnLst>
+                              <p:par>
                                 <p:cTn id="5" presetClass="entr" nodeType="afterEffect" presetSubtype="8" presetID="15" grpId="1" fill="hold">
                                   <p:stCondLst>
                                     <p:cond delay="0"/>
@@ -7238,7 +10308,7 @@
                                       <p:cBhvr>
                                         <p:cTn id="6" fill="hold"/>
                                         <p:tgtEl>
-                                          <p:spTgt spid="138">
+                                          <p:spTgt spid="141">
                                             <p:bg/>
                                           </p:spTgt>
                                         </p:tgtEl>
@@ -7254,7 +10324,7 @@
                                       <p:cBhvr>
                                         <p:cTn id="7" dur="1500" fill="hold"/>
                                         <p:tgtEl>
-                                          <p:spTgt spid="138">
+                                          <p:spTgt spid="141">
                                             <p:bg/>
                                           </p:spTgt>
                                         </p:tgtEl>
@@ -7279,7 +10349,7 @@
                                       <p:cBhvr>
                                         <p:cTn id="8" dur="1500" fill="hold"/>
                                         <p:tgtEl>
-                                          <p:spTgt spid="138">
+                                          <p:spTgt spid="141">
                                             <p:bg/>
                                           </p:spTgt>
                                         </p:tgtEl>
@@ -7304,7 +10374,7 @@
                                       <p:cBhvr>
                                         <p:cTn id="9" dur="1500" fill="hold"/>
                                         <p:tgtEl>
-                                          <p:spTgt spid="138">
+                                          <p:spTgt spid="141">
                                             <p:bg/>
                                           </p:spTgt>
                                         </p:tgtEl>
@@ -7329,7 +10399,7 @@
                                       <p:cBhvr>
                                         <p:cTn id="10" dur="1500" fill="hold"/>
                                         <p:tgtEl>
-                                          <p:spTgt spid="138">
+                                          <p:spTgt spid="141">
                                             <p:bg/>
                                           </p:spTgt>
                                         </p:tgtEl>
@@ -7366,7 +10436,7 @@
                                       <p:cBhvr>
                                         <p:cTn id="12" fill="hold"/>
                                         <p:tgtEl>
-                                          <p:spTgt spid="138">
+                                          <p:spTgt spid="141">
                                             <p:txEl>
                                               <p:pRg st="0" end="0"/>
                                             </p:txEl>
@@ -7384,7 +10454,7 @@
                                       <p:cBhvr>
                                         <p:cTn id="13" dur="1500" fill="hold"/>
                                         <p:tgtEl>
-                                          <p:spTgt spid="138">
+                                          <p:spTgt spid="141">
                                             <p:txEl>
                                               <p:pRg st="0" end="0"/>
                                             </p:txEl>
@@ -7411,7 +10481,7 @@
                                       <p:cBhvr>
                                         <p:cTn id="14" dur="1500" fill="hold"/>
                                         <p:tgtEl>
-                                          <p:spTgt spid="138">
+                                          <p:spTgt spid="141">
                                             <p:txEl>
                                               <p:pRg st="0" end="0"/>
                                             </p:txEl>
@@ -7438,7 +10508,7 @@
                                       <p:cBhvr>
                                         <p:cTn id="15" dur="1500" fill="hold"/>
                                         <p:tgtEl>
-                                          <p:spTgt spid="138">
+                                          <p:spTgt spid="141">
                                             <p:txEl>
                                               <p:pRg st="0" end="0"/>
                                             </p:txEl>
@@ -7465,7 +10535,7 @@
                                       <p:cBhvr>
                                         <p:cTn id="16" dur="1500" fill="hold"/>
                                         <p:tgtEl>
-                                          <p:spTgt spid="138">
+                                          <p:spTgt spid="141">
                                             <p:txEl>
                                               <p:pRg st="0" end="0"/>
                                             </p:txEl>
@@ -7522,7 +10592,7 @@
                                       <p:cBhvr>
                                         <p:cTn id="20" fill="hold"/>
                                         <p:tgtEl>
-                                          <p:spTgt spid="139"/>
+                                          <p:spTgt spid="142"/>
                                         </p:tgtEl>
                                         <p:attrNameLst>
                                           <p:attrName>style.visibility</p:attrName>
@@ -7536,7 +10606,7 @@
                                       <p:cBhvr>
                                         <p:cTn id="21" dur="750" fill="hold"/>
                                         <p:tgtEl>
-                                          <p:spTgt spid="139"/>
+                                          <p:spTgt spid="142"/>
                                         </p:tgtEl>
                                         <p:attrNameLst>
                                           <p:attrName>ppt_w</p:attrName>
@@ -7559,7 +10629,7 @@
                                       <p:cBhvr>
                                         <p:cTn id="22" dur="750" fill="hold"/>
                                         <p:tgtEl>
-                                          <p:spTgt spid="139"/>
+                                          <p:spTgt spid="142"/>
                                         </p:tgtEl>
                                         <p:attrNameLst>
                                           <p:attrName>ppt_h</p:attrName>
@@ -7609,314 +10679,8 @@
       </p:par>
     </p:tnLst>
     <p:bldLst>
-      <p:bldP build="p" bldLvl="5" animBg="1" rev="0" advAuto="0" spid="138" grpId="1"/>
-      <p:bldP build="whole" bldLvl="1" animBg="1" rev="0" advAuto="0" spid="139" grpId="2"/>
-    </p:bldLst>
-  </p:timing>
-</p:sld>
-</file>
-
-<file path=ppt/slides/slide8.xml><?xml version="1.0" encoding="utf-8"?>
-<p:sld xmlns:a="http://schemas.openxmlformats.org/drawingml/2006/main" xmlns:r="http://schemas.openxmlformats.org/officeDocument/2006/relationships" xmlns:p="http://schemas.openxmlformats.org/presentationml/2006/main" xmlns:m="http://schemas.openxmlformats.org/officeDocument/2006/math" xmlns:a14="http://schemas.microsoft.com/office/drawing/2010/main" showMasterSp="1" showMasterPhAnim="1">
-  <p:cSld>
-    <p:bg>
-      <p:bgPr>
-        <a:gradFill flip="none" rotWithShape="1">
-          <a:gsLst>
-            <a:gs pos="0">
-              <a:srgbClr val="FCBD00"/>
-            </a:gs>
-            <a:gs pos="35000">
-              <a:srgbClr val="FFE4D1"/>
-            </a:gs>
-            <a:gs pos="100000">
-              <a:srgbClr val="FEDF98"/>
-            </a:gs>
-          </a:gsLst>
-          <a:lin ang="0" scaled="0"/>
-        </a:gradFill>
-      </p:bgPr>
-    </p:bg>
-    <p:spTree>
-      <p:nvGrpSpPr>
-        <p:cNvPr id="1" name=""/>
-        <p:cNvGrpSpPr/>
-        <p:nvPr/>
-      </p:nvGrpSpPr>
-      <p:grpSpPr>
-        <a:xfrm>
-          <a:off x="0" y="0"/>
-          <a:ext cx="0" cy="0"/>
-          <a:chOff x="0" y="0"/>
-          <a:chExt cx="0" cy="0"/>
-        </a:xfrm>
-      </p:grpSpPr>
-      <p:sp>
-        <p:nvSpPr>
-          <p:cNvPr id="141" name="Google Shape;95;p20"/>
-          <p:cNvSpPr txBox="1"/>
-          <p:nvPr>
-            <p:ph type="body" sz="quarter" idx="1"/>
-          </p:nvPr>
-        </p:nvSpPr>
-        <p:spPr>
-          <a:xfrm>
-            <a:off x="311699" y="301575"/>
-            <a:ext cx="8520602" cy="546101"/>
-          </a:xfrm>
-          <a:prstGeom prst="rect">
-            <a:avLst/>
-          </a:prstGeom>
-        </p:spPr>
-        <p:txBody>
-          <a:bodyPr/>
-          <a:lstStyle>
-            <a:lvl1pPr marL="0" indent="0" algn="ctr" defTabSz="557784">
-              <a:lnSpc>
-                <a:spcPct val="100000"/>
-              </a:lnSpc>
-              <a:buClrTx/>
-              <a:buSzTx/>
-              <a:buFontTx/>
-              <a:buNone/>
-              <a:defRPr sz="2562">
-                <a:solidFill>
-                  <a:srgbClr val="000000"/>
-                </a:solidFill>
-              </a:defRPr>
-            </a:lvl1pPr>
-          </a:lstStyle>
-          <a:p>
-            <a:pPr/>
-            <a:r>
-              <a:t>Google Search Trends</a:t>
-            </a:r>
-          </a:p>
-        </p:txBody>
-      </p:sp>
-      <p:pic>
-        <p:nvPicPr>
-          <p:cNvPr id="142" name="Bitcoin_search.png" descr="Bitcoin_search.png"/>
-          <p:cNvPicPr>
-            <a:picLocks noChangeAspect="1"/>
-          </p:cNvPicPr>
-          <p:nvPr/>
-        </p:nvPicPr>
-        <p:blipFill>
-          <a:blip r:embed="rId2">
-            <a:extLst/>
-          </a:blip>
-          <a:stretch>
-            <a:fillRect/>
-          </a:stretch>
-        </p:blipFill>
-        <p:spPr>
-          <a:xfrm>
-            <a:off x="48048" y="1377094"/>
-            <a:ext cx="9047904" cy="2552701"/>
-          </a:xfrm>
-          <a:prstGeom prst="rect">
-            <a:avLst/>
-          </a:prstGeom>
-          <a:ln w="12700">
-            <a:miter lim="400000"/>
-          </a:ln>
-        </p:spPr>
-      </p:pic>
-    </p:spTree>
-  </p:cSld>
-  <p:clrMapOvr>
-    <a:masterClrMapping/>
-  </p:clrMapOvr>
-  <mc:AlternateContent xmlns:mc="http://schemas.openxmlformats.org/markup-compatibility/2006">
-    <mc:Choice xmlns:p14="http://schemas.microsoft.com/office/powerpoint/2010/main" Requires="p14">
-      <p:transition spd="slow" advClick="1" p14:dur="2000">
-        <p:push dir="l"/>
-      </p:transition>
-    </mc:Choice>
-    <mc:Fallback>
-      <p:transition spd="slow">
-        <p:fade/>
-      </p:transition>
-    </mc:Fallback>
-  </mc:AlternateContent>
-  <p:timing>
-    <p:tnLst>
-      <p:par>
-        <p:cTn id="1" nodeType="tmRoot" restart="never" dur="indefinite" fill="hold">
-          <p:childTnLst>
-            <p:seq concurrent="1" prevAc="none" nextAc="seek">
-              <p:cTn id="2" nodeType="mainSeq" dur="indefinite" fill="hold">
-                <p:childTnLst>
-                  <p:par>
-                    <p:cTn id="3" fill="hold">
-                      <p:stCondLst>
-                        <p:cond delay="indefinite"/>
-                        <p:cond evt="onBegin">
-                          <p:tn val="2"/>
-                        </p:cond>
-                      </p:stCondLst>
-                      <p:childTnLst>
-                        <p:par>
-                          <p:cTn id="4" fill="hold">
-                            <p:stCondLst>
-                              <p:cond delay="0"/>
-                            </p:stCondLst>
-                            <p:childTnLst>
-                              <p:par>
-                                <p:cTn id="5" presetClass="entr" nodeType="afterEffect" presetSubtype="32" presetID="23" grpId="1" fill="hold">
-                                  <p:stCondLst>
-                                    <p:cond delay="0"/>
-                                  </p:stCondLst>
-                                  <p:iterate type="el" backwards="0">
-                                    <p:tmAbs val="0"/>
-                                  </p:iterate>
-                                  <p:childTnLst>
-                                    <p:set>
-                                      <p:cBhvr>
-                                        <p:cTn id="6" fill="hold"/>
-                                        <p:tgtEl>
-                                          <p:spTgt spid="141"/>
-                                        </p:tgtEl>
-                                        <p:attrNameLst>
-                                          <p:attrName>style.visibility</p:attrName>
-                                        </p:attrNameLst>
-                                      </p:cBhvr>
-                                      <p:to>
-                                        <p:strVal val="visible"/>
-                                      </p:to>
-                                    </p:set>
-                                    <p:anim calcmode="lin" valueType="num">
-                                      <p:cBhvr>
-                                        <p:cTn id="7" dur="1000" fill="hold"/>
-                                        <p:tgtEl>
-                                          <p:spTgt spid="141"/>
-                                        </p:tgtEl>
-                                        <p:attrNameLst>
-                                          <p:attrName>ppt_w</p:attrName>
-                                        </p:attrNameLst>
-                                      </p:cBhvr>
-                                      <p:tavLst>
-                                        <p:tav tm="0">
-                                          <p:val>
-                                            <p:strVal val="4*#ppt_w"/>
-                                          </p:val>
-                                        </p:tav>
-                                        <p:tav tm="100000">
-                                          <p:val>
-                                            <p:strVal val="#ppt_w"/>
-                                          </p:val>
-                                        </p:tav>
-                                      </p:tavLst>
-                                    </p:anim>
-                                    <p:anim calcmode="lin" valueType="num">
-                                      <p:cBhvr>
-                                        <p:cTn id="8" dur="1000" fill="hold"/>
-                                        <p:tgtEl>
-                                          <p:spTgt spid="141"/>
-                                        </p:tgtEl>
-                                        <p:attrNameLst>
-                                          <p:attrName>ppt_h</p:attrName>
-                                        </p:attrNameLst>
-                                      </p:cBhvr>
-                                      <p:tavLst>
-                                        <p:tav tm="0">
-                                          <p:val>
-                                            <p:strVal val="4*#ppt_h"/>
-                                          </p:val>
-                                        </p:tav>
-                                        <p:tav tm="100000">
-                                          <p:val>
-                                            <p:strVal val="#ppt_h"/>
-                                          </p:val>
-                                        </p:tav>
-                                      </p:tavLst>
-                                    </p:anim>
-                                  </p:childTnLst>
-                                </p:cTn>
-                              </p:par>
-                            </p:childTnLst>
-                          </p:cTn>
-                        </p:par>
-                      </p:childTnLst>
-                    </p:cTn>
-                  </p:par>
-                  <p:par>
-                    <p:cTn id="9" fill="hold">
-                      <p:stCondLst>
-                        <p:cond delay="indefinite"/>
-                      </p:stCondLst>
-                      <p:childTnLst>
-                        <p:par>
-                          <p:cTn id="10" fill="hold">
-                            <p:stCondLst>
-                              <p:cond delay="0"/>
-                            </p:stCondLst>
-                            <p:childTnLst>
-                              <p:par>
-                                <p:cTn id="11" presetClass="entr" nodeType="clickEffect" presetSubtype="5" presetID="3" grpId="2" fill="hold">
-                                  <p:stCondLst>
-                                    <p:cond delay="0"/>
-                                  </p:stCondLst>
-                                  <p:iterate type="el" backwards="0">
-                                    <p:tmAbs val="0"/>
-                                  </p:iterate>
-                                  <p:childTnLst>
-                                    <p:set>
-                                      <p:cBhvr>
-                                        <p:cTn id="12" fill="hold"/>
-                                        <p:tgtEl>
-                                          <p:spTgt spid="142"/>
-                                        </p:tgtEl>
-                                        <p:attrNameLst>
-                                          <p:attrName>style.visibility</p:attrName>
-                                        </p:attrNameLst>
-                                      </p:cBhvr>
-                                      <p:to>
-                                        <p:strVal val="visible"/>
-                                      </p:to>
-                                    </p:set>
-                                    <p:animEffect filter="blinds(vertical)" transition="in">
-                                      <p:cBhvr>
-                                        <p:cTn id="13" dur="1000"/>
-                                        <p:tgtEl>
-                                          <p:spTgt spid="142"/>
-                                        </p:tgtEl>
-                                      </p:cBhvr>
-                                    </p:animEffect>
-                                  </p:childTnLst>
-                                </p:cTn>
-                              </p:par>
-                            </p:childTnLst>
-                          </p:cTn>
-                        </p:par>
-                      </p:childTnLst>
-                    </p:cTn>
-                  </p:par>
-                </p:childTnLst>
-              </p:cTn>
-              <p:prevCondLst>
-                <p:cond evt="onPrev">
-                  <p:tgtEl>
-                    <p:sldTgt/>
-                  </p:tgtEl>
-                </p:cond>
-              </p:prevCondLst>
-              <p:nextCondLst>
-                <p:cond evt="onNext">
-                  <p:tgtEl>
-                    <p:sldTgt/>
-                  </p:tgtEl>
-                </p:cond>
-              </p:nextCondLst>
-            </p:seq>
-          </p:childTnLst>
-        </p:cTn>
-      </p:par>
-    </p:tnLst>
-    <p:bldLst>
       <p:bldP build="whole" bldLvl="1" animBg="1" rev="0" advAuto="0" spid="142" grpId="2"/>
-      <p:bldP build="whole" bldLvl="1" animBg="1" rev="0" advAuto="0" spid="141" grpId="1"/>
+      <p:bldP build="p" bldLvl="5" animBg="1" rev="0" advAuto="0" spid="141" grpId="1"/>
     </p:bldLst>
   </p:timing>
 </p:sld>
@@ -7995,16 +10759,16 @@
           <a:p>
             <a:pPr/>
             <a:r>
-              <a:t>Google Search Trends Overlayed Bitcoin Price</a:t>
+              <a:t>Google Search Trends</a:t>
             </a:r>
           </a:p>
         </p:txBody>
       </p:sp>
       <p:pic>
         <p:nvPicPr>
-          <p:cNvPr id="145" name="BTC_price_search.png" descr="BTC_price_search.png"/>
+          <p:cNvPr id="145" name="Bitcoin_search.png" descr="Bitcoin_search.png"/>
           <p:cNvPicPr>
-            <a:picLocks noChangeAspect="0"/>
+            <a:picLocks noChangeAspect="1"/>
           </p:cNvPicPr>
           <p:nvPr/>
         </p:nvPicPr>
@@ -8018,8 +10782,8 @@
         </p:blipFill>
         <p:spPr>
           <a:xfrm>
-            <a:off x="198565" y="1066800"/>
-            <a:ext cx="8940801" cy="3962400"/>
+            <a:off x="48048" y="1377094"/>
+            <a:ext cx="9047904" cy="2552701"/>
           </a:xfrm>
           <a:prstGeom prst="rect">
             <a:avLst/>
@@ -8027,13 +10791,6 @@
           <a:ln w="12700">
             <a:miter lim="400000"/>
           </a:ln>
-          <a:effectLst>
-            <a:outerShdw sx="100000" sy="100000" kx="0" ky="0" algn="b" rotWithShape="0" blurRad="254000" dist="127000" dir="16200000">
-              <a:srgbClr val="000000">
-                <a:alpha val="70000"/>
-              </a:srgbClr>
-            </a:outerShdw>
-          </a:effectLst>
         </p:spPr>
       </p:pic>
     </p:spTree>
@@ -8043,12 +10800,12 @@
   </p:clrMapOvr>
   <mc:AlternateContent xmlns:mc="http://schemas.openxmlformats.org/markup-compatibility/2006">
     <mc:Choice xmlns:p14="http://schemas.microsoft.com/office/powerpoint/2010/main" Requires="p14">
-      <p:transition spd="fast" advClick="1" p14:dur="750">
+      <p:transition spd="slow" advClick="1" p14:dur="2000">
         <p:push dir="l"/>
       </p:transition>
     </mc:Choice>
     <mc:Fallback>
-      <p:transition spd="fast">
+      <p:transition spd="slow">
         <p:fade/>
       </p:transition>
     </mc:Fallback>
@@ -8077,7 +10834,7 @@
                             </p:stCondLst>
                             <p:childTnLst>
                               <p:par>
-                                <p:cTn id="5" presetClass="entr" nodeType="afterEffect" presetID="9" grpId="1" fill="hold">
+                                <p:cTn id="5" presetClass="entr" nodeType="afterEffect" presetSubtype="32" presetID="23" grpId="1" fill="hold">
                                   <p:stCondLst>
                                     <p:cond delay="0"/>
                                   </p:stCondLst>
@@ -8099,14 +10856,52 @@
                                         <p:strVal val="visible"/>
                                       </p:to>
                                     </p:set>
-                                    <p:animEffect filter="dissolve" transition="in">
-                                      <p:cBhvr>
-                                        <p:cTn id="7" dur="1000"/>
+                                    <p:anim calcmode="lin" valueType="num">
+                                      <p:cBhvr>
+                                        <p:cTn id="7" dur="1000" fill="hold"/>
                                         <p:tgtEl>
                                           <p:spTgt spid="144"/>
                                         </p:tgtEl>
-                                      </p:cBhvr>
-                                    </p:animEffect>
+                                        <p:attrNameLst>
+                                          <p:attrName>ppt_w</p:attrName>
+                                        </p:attrNameLst>
+                                      </p:cBhvr>
+                                      <p:tavLst>
+                                        <p:tav tm="0">
+                                          <p:val>
+                                            <p:strVal val="4*#ppt_w"/>
+                                          </p:val>
+                                        </p:tav>
+                                        <p:tav tm="100000">
+                                          <p:val>
+                                            <p:strVal val="#ppt_w"/>
+                                          </p:val>
+                                        </p:tav>
+                                      </p:tavLst>
+                                    </p:anim>
+                                    <p:anim calcmode="lin" valueType="num">
+                                      <p:cBhvr>
+                                        <p:cTn id="8" dur="1000" fill="hold"/>
+                                        <p:tgtEl>
+                                          <p:spTgt spid="144"/>
+                                        </p:tgtEl>
+                                        <p:attrNameLst>
+                                          <p:attrName>ppt_h</p:attrName>
+                                        </p:attrNameLst>
+                                      </p:cBhvr>
+                                      <p:tavLst>
+                                        <p:tav tm="0">
+                                          <p:val>
+                                            <p:strVal val="4*#ppt_h"/>
+                                          </p:val>
+                                        </p:tav>
+                                        <p:tav tm="100000">
+                                          <p:val>
+                                            <p:strVal val="#ppt_h"/>
+                                          </p:val>
+                                        </p:tav>
+                                      </p:tavLst>
+                                    </p:anim>
                                   </p:childTnLst>
                                 </p:cTn>
                               </p:par>
@@ -8117,19 +10912,19 @@
                     </p:cTn>
                   </p:par>
                   <p:par>
-                    <p:cTn id="8" fill="hold">
+                    <p:cTn id="9" fill="hold">
                       <p:stCondLst>
                         <p:cond delay="indefinite"/>
                       </p:stCondLst>
                       <p:childTnLst>
                         <p:par>
-                          <p:cTn id="9" fill="hold">
+                          <p:cTn id="10" fill="hold">
                             <p:stCondLst>
                               <p:cond delay="0"/>
                             </p:stCondLst>
                             <p:childTnLst>
                               <p:par>
-                                <p:cTn id="10" presetClass="entr" nodeType="clickEffect" presetID="10" grpId="2" fill="hold">
+                                <p:cTn id="11" presetClass="entr" nodeType="clickEffect" presetSubtype="5" presetID="3" grpId="2" fill="hold">
                                   <p:stCondLst>
                                     <p:cond delay="0"/>
                                   </p:stCondLst>
@@ -8139,7 +10934,7 @@
                                   <p:childTnLst>
                                     <p:set>
                                       <p:cBhvr>
-                                        <p:cTn id="11" fill="hold"/>
+                                        <p:cTn id="12" fill="hold"/>
                                         <p:tgtEl>
                                           <p:spTgt spid="145"/>
                                         </p:tgtEl>
@@ -8151,9 +10946,9 @@
                                         <p:strVal val="visible"/>
                                       </p:to>
                                     </p:set>
-                                    <p:animEffect filter="fade" transition="in">
-                                      <p:cBhvr>
-                                        <p:cTn id="12" dur="1500"/>
+                                    <p:animEffect filter="blinds(vertical)" transition="in">
+                                      <p:cBhvr>
+                                        <p:cTn id="13" dur="1000"/>
                                         <p:tgtEl>
                                           <p:spTgt spid="145"/>
                                         </p:tgtEl>
@@ -8190,8 +10985,8 @@
       </p:par>
     </p:tnLst>
     <p:bldLst>
+      <p:bldP build="whole" bldLvl="1" animBg="1" rev="0" advAuto="0" spid="145" grpId="2"/>
       <p:bldP build="whole" bldLvl="1" animBg="1" rev="0" advAuto="0" spid="144" grpId="1"/>
-      <p:bldP build="whole" bldLvl="1" animBg="1" rev="0" advAuto="0" spid="145" grpId="2"/>
     </p:bldLst>
   </p:timing>
 </p:sld>

</xml_diff>